<commit_message>
updating documentation. linked up starting the exercises
</commit_message>
<xml_diff>
--- a/documentation/poster.pptx
+++ b/documentation/poster.pptx
@@ -200,7 +200,7 @@
           <a:p>
             <a:fld id="{7A742C25-6B9D-4BBC-B963-7C0051B7F1C0}" type="datetimeFigureOut">
               <a:rPr lang="en-US" smtClean="0"/>
-              <a:t>11/15/2018</a:t>
+              <a:t>3/31/2019</a:t>
             </a:fld>
             <a:endParaRPr lang="en-US"/>
           </a:p>
@@ -365,7 +365,7 @@
           <a:p>
             <a:fld id="{6337218B-FAD9-4329-997D-1F8E36863CDC}" type="datetimeFigureOut">
               <a:rPr lang="en-US" smtClean="0"/>
-              <a:t>11/15/2018</a:t>
+              <a:t>3/31/2019</a:t>
             </a:fld>
             <a:endParaRPr lang="en-US"/>
           </a:p>
@@ -892,7 +892,7 @@
           <a:p>
             <a:fld id="{D2033A72-562D-473B-B2EC-CFF4CA1A8D42}" type="datetimeFigureOut">
               <a:rPr lang="en-US" smtClean="0"/>
-              <a:t>11/15/2018</a:t>
+              <a:t>3/31/2019</a:t>
             </a:fld>
             <a:endParaRPr lang="en-US"/>
           </a:p>
@@ -1062,7 +1062,7 @@
           <a:p>
             <a:fld id="{D2033A72-562D-473B-B2EC-CFF4CA1A8D42}" type="datetimeFigureOut">
               <a:rPr lang="en-US" smtClean="0"/>
-              <a:t>11/15/2018</a:t>
+              <a:t>3/31/2019</a:t>
             </a:fld>
             <a:endParaRPr lang="en-US"/>
           </a:p>
@@ -1242,7 +1242,7 @@
           <a:p>
             <a:fld id="{D2033A72-562D-473B-B2EC-CFF4CA1A8D42}" type="datetimeFigureOut">
               <a:rPr lang="en-US" smtClean="0"/>
-              <a:t>11/15/2018</a:t>
+              <a:t>3/31/2019</a:t>
             </a:fld>
             <a:endParaRPr lang="en-US"/>
           </a:p>
@@ -1412,7 +1412,7 @@
           <a:p>
             <a:fld id="{D2033A72-562D-473B-B2EC-CFF4CA1A8D42}" type="datetimeFigureOut">
               <a:rPr lang="en-US" smtClean="0"/>
-              <a:t>11/15/2018</a:t>
+              <a:t>3/31/2019</a:t>
             </a:fld>
             <a:endParaRPr lang="en-US"/>
           </a:p>
@@ -1656,7 +1656,7 @@
           <a:p>
             <a:fld id="{D2033A72-562D-473B-B2EC-CFF4CA1A8D42}" type="datetimeFigureOut">
               <a:rPr lang="en-US" smtClean="0"/>
-              <a:t>11/15/2018</a:t>
+              <a:t>3/31/2019</a:t>
             </a:fld>
             <a:endParaRPr lang="en-US"/>
           </a:p>
@@ -1888,7 +1888,7 @@
           <a:p>
             <a:fld id="{D2033A72-562D-473B-B2EC-CFF4CA1A8D42}" type="datetimeFigureOut">
               <a:rPr lang="en-US" smtClean="0"/>
-              <a:t>11/15/2018</a:t>
+              <a:t>3/31/2019</a:t>
             </a:fld>
             <a:endParaRPr lang="en-US"/>
           </a:p>
@@ -2255,7 +2255,7 @@
           <a:p>
             <a:fld id="{D2033A72-562D-473B-B2EC-CFF4CA1A8D42}" type="datetimeFigureOut">
               <a:rPr lang="en-US" smtClean="0"/>
-              <a:t>11/15/2018</a:t>
+              <a:t>3/31/2019</a:t>
             </a:fld>
             <a:endParaRPr lang="en-US"/>
           </a:p>
@@ -2373,7 +2373,7 @@
           <a:p>
             <a:fld id="{D2033A72-562D-473B-B2EC-CFF4CA1A8D42}" type="datetimeFigureOut">
               <a:rPr lang="en-US" smtClean="0"/>
-              <a:t>11/15/2018</a:t>
+              <a:t>3/31/2019</a:t>
             </a:fld>
             <a:endParaRPr lang="en-US"/>
           </a:p>
@@ -2468,7 +2468,7 @@
           <a:p>
             <a:fld id="{D2033A72-562D-473B-B2EC-CFF4CA1A8D42}" type="datetimeFigureOut">
               <a:rPr lang="en-US" smtClean="0"/>
-              <a:t>11/15/2018</a:t>
+              <a:t>3/31/2019</a:t>
             </a:fld>
             <a:endParaRPr lang="en-US"/>
           </a:p>
@@ -2745,7 +2745,7 @@
           <a:p>
             <a:fld id="{D2033A72-562D-473B-B2EC-CFF4CA1A8D42}" type="datetimeFigureOut">
               <a:rPr lang="en-US" smtClean="0"/>
-              <a:t>11/15/2018</a:t>
+              <a:t>3/31/2019</a:t>
             </a:fld>
             <a:endParaRPr lang="en-US"/>
           </a:p>
@@ -3002,7 +3002,7 @@
           <a:p>
             <a:fld id="{D2033A72-562D-473B-B2EC-CFF4CA1A8D42}" type="datetimeFigureOut">
               <a:rPr lang="en-US" smtClean="0"/>
-              <a:t>11/15/2018</a:t>
+              <a:t>3/31/2019</a:t>
             </a:fld>
             <a:endParaRPr lang="en-US"/>
           </a:p>
@@ -3215,7 +3215,7 @@
           <a:p>
             <a:fld id="{D2033A72-562D-473B-B2EC-CFF4CA1A8D42}" type="datetimeFigureOut">
               <a:rPr lang="en-US" smtClean="0"/>
-              <a:t>11/15/2018</a:t>
+              <a:t>3/31/2019</a:t>
             </a:fld>
             <a:endParaRPr lang="en-US"/>
           </a:p>
@@ -4371,8 +4371,8 @@
         </p:nvSpPr>
         <p:spPr>
           <a:xfrm>
-            <a:off x="11502191" y="11659036"/>
-            <a:ext cx="9990220" cy="8350268"/>
+            <a:off x="11502189" y="11663529"/>
+            <a:ext cx="9997632" cy="8345775"/>
           </a:xfrm>
           <a:prstGeom prst="rect">
             <a:avLst/>
@@ -4402,7 +4402,7 @@
           <a:lstStyle/>
           <a:p>
             <a:pPr algn="ctr"/>
-            <a:endParaRPr lang="en-US"/>
+            <a:endParaRPr lang="en-US" dirty="0"/>
           </a:p>
         </p:txBody>
       </p:sp>
@@ -4899,31 +4899,7 @@
             </a:r>
             <a:r>
               <a:rPr lang="en-US" sz="4000" dirty="0" smtClean="0"/>
-              <a:t>sers </a:t>
-            </a:r>
-            <a:r>
-              <a:rPr lang="en-US" sz="4000" dirty="0" smtClean="0"/>
-              <a:t>can </a:t>
-            </a:r>
-            <a:r>
-              <a:rPr lang="en-US" sz="4000" dirty="0" smtClean="0"/>
-              <a:t>start </a:t>
-            </a:r>
-            <a:r>
-              <a:rPr lang="en-US" sz="4000" dirty="0" smtClean="0"/>
-              <a:t>hacking in their own virtual environment.  Administrators can </a:t>
-            </a:r>
-            <a:r>
-              <a:rPr lang="en-US" sz="4000" dirty="0" smtClean="0"/>
-              <a:t>view </a:t>
-            </a:r>
-            <a:r>
-              <a:rPr lang="en-US" sz="4000" dirty="0" smtClean="0"/>
-              <a:t>completed exercises and send grades to </a:t>
-            </a:r>
-            <a:r>
-              <a:rPr lang="en-US" sz="4000" dirty="0" smtClean="0"/>
-              <a:t>users.</a:t>
+              <a:t>sers can start hacking in their own virtual environment.  Administrators can view completed exercises and send grades to users.</a:t>
             </a:r>
             <a:endParaRPr lang="en-US" sz="4000" dirty="0"/>
           </a:p>
@@ -4953,31 +4929,7 @@
           <a:p>
             <a:r>
               <a:rPr lang="en-US" sz="4000" dirty="0" smtClean="0"/>
-              <a:t>This application was planned and developed using the Agile framework.  DevOps principles of tested driven development, automated test, continuous integration, and continuous deployment were used. </a:t>
-            </a:r>
-            <a:r>
-              <a:rPr lang="en-US" sz="4000" dirty="0" smtClean="0"/>
-              <a:t>The </a:t>
-            </a:r>
-            <a:r>
-              <a:rPr lang="en-US" sz="4000" dirty="0" smtClean="0"/>
-              <a:t>CI/CD pipeline utilized </a:t>
-            </a:r>
-            <a:r>
-              <a:rPr lang="en-US" sz="4000" dirty="0" smtClean="0"/>
-              <a:t>code and web scanners to </a:t>
-            </a:r>
-            <a:r>
-              <a:rPr lang="en-US" sz="4000" dirty="0" smtClean="0"/>
-              <a:t>ensure </a:t>
-            </a:r>
-            <a:r>
-              <a:rPr lang="en-US" sz="4000" dirty="0" smtClean="0"/>
-              <a:t>code is </a:t>
-            </a:r>
-            <a:r>
-              <a:rPr lang="en-US" sz="4000" dirty="0" smtClean="0"/>
-              <a:t>lean and secure.</a:t>
+              <a:t>This application was planned and developed using the Agile framework.  DevOps principles of tested driven development, automated test, continuous integration, and continuous deployment were used. The CI/CD pipeline utilized code and web scanners to ensure code is lean and secure.</a:t>
             </a:r>
             <a:endParaRPr lang="en-US" sz="4000" dirty="0"/>
           </a:p>
@@ -5007,15 +4959,7 @@
           <a:p>
             <a:r>
               <a:rPr lang="en-US" sz="4000" dirty="0" smtClean="0"/>
-              <a:t>Security training is desired in all parts of industry: secure coding for </a:t>
-            </a:r>
-            <a:r>
-              <a:rPr lang="en-US" sz="4000" dirty="0" smtClean="0"/>
-              <a:t>developers, </a:t>
-            </a:r>
-            <a:r>
-              <a:rPr lang="en-US" sz="4000" dirty="0" smtClean="0"/>
-              <a:t>Q/A Testers, and Security Engineers.  There are several virtual machines to practice security, but none have a student-teacher model.  </a:t>
+              <a:t>Security training is desired in all parts of industry: secure coding for developers, Q/A Testers, and Security Engineers.  There are several virtual machines to practice security, but none have a student-teacher model.  </a:t>
             </a:r>
             <a:r>
               <a:rPr lang="en-US" sz="4000" dirty="0"/>
@@ -5023,15 +4967,7 @@
             </a:r>
             <a:r>
               <a:rPr lang="en-US" sz="4000" dirty="0" smtClean="0"/>
-              <a:t>tudents can now </a:t>
-            </a:r>
-            <a:r>
-              <a:rPr lang="en-US" sz="4000" dirty="0" smtClean="0"/>
-              <a:t>easily begin learning </a:t>
-            </a:r>
-            <a:r>
-              <a:rPr lang="en-US" sz="4000" dirty="0" smtClean="0"/>
-              <a:t>security</a:t>
+              <a:t>tudents can now easily begin learning security</a:t>
             </a:r>
             <a:r>
               <a:rPr lang="en-US" sz="4000" dirty="0"/>
@@ -5047,14 +4983,14 @@
       </p:sp>
       <p:sp>
         <p:nvSpPr>
-          <p:cNvPr id="46" name="TextBox 45"/>
+          <p:cNvPr id="47" name="TextBox 46"/>
           <p:cNvSpPr txBox="1"/>
           <p:nvPr/>
         </p:nvSpPr>
         <p:spPr>
           <a:xfrm>
-            <a:off x="11742421" y="13222475"/>
-            <a:ext cx="9509760" cy="890115"/>
+            <a:off x="615215" y="20513360"/>
+            <a:ext cx="9509760" cy="8094524"/>
           </a:xfrm>
           <a:prstGeom prst="rect">
             <a:avLst/>
@@ -5068,23 +5004,91 @@
           <a:lstStyle/>
           <a:p>
             <a:r>
-              <a:rPr lang="en-US" dirty="0" smtClean="0"/>
-              <a:t>Diagram Title</a:t>
-            </a:r>
-            <a:endParaRPr lang="en-US" dirty="0"/>
-          </a:p>
-        </p:txBody>
-      </p:sp>
-      <p:sp>
-        <p:nvSpPr>
-          <p:cNvPr id="47" name="TextBox 46"/>
+              <a:rPr lang="en-US" sz="4000" dirty="0" smtClean="0"/>
+              <a:t>1 </a:t>
+            </a:r>
+            <a:r>
+              <a:rPr lang="en-US" sz="4000" dirty="0"/>
+              <a:t>–  Student interface for starting, stopping, and restarting exercises.  There should also be a place to submit answers for exercises</a:t>
+            </a:r>
+          </a:p>
+          <a:p>
+            <a:r>
+              <a:rPr lang="en-US" sz="4000" dirty="0" smtClean="0"/>
+              <a:t>2 – Instructor </a:t>
+            </a:r>
+            <a:r>
+              <a:rPr lang="en-US" sz="4000" dirty="0"/>
+              <a:t>interface for creating, editing, deleting: classes, exercises, students, and managing application performance</a:t>
+            </a:r>
+          </a:p>
+          <a:p>
+            <a:r>
+              <a:rPr lang="en-US" sz="4000" dirty="0" smtClean="0"/>
+              <a:t>3 – Instructors </a:t>
+            </a:r>
+            <a:r>
+              <a:rPr lang="en-US" sz="4000" dirty="0"/>
+              <a:t>should be able to easily check and email grades</a:t>
+            </a:r>
+          </a:p>
+          <a:p>
+            <a:r>
+              <a:rPr lang="en-US" sz="4000" dirty="0" smtClean="0"/>
+              <a:t>4 </a:t>
+            </a:r>
+            <a:r>
+              <a:rPr lang="en-US" sz="4000" dirty="0"/>
+              <a:t>– Must contain 1 web security exercise</a:t>
+            </a:r>
+          </a:p>
+          <a:p>
+            <a:r>
+              <a:rPr lang="en-US" sz="4000" dirty="0" smtClean="0"/>
+              <a:t>5 – Must </a:t>
+            </a:r>
+            <a:r>
+              <a:rPr lang="en-US" sz="4000" dirty="0"/>
+              <a:t>contain 1 desktop security exercise</a:t>
+            </a:r>
+          </a:p>
+          <a:p>
+            <a:r>
+              <a:rPr lang="en-US" sz="4000" dirty="0" smtClean="0"/>
+              <a:t>6 – Must </a:t>
+            </a:r>
+            <a:r>
+              <a:rPr lang="en-US" sz="4000" dirty="0"/>
+              <a:t>be developed securely</a:t>
+            </a:r>
+          </a:p>
+          <a:p>
+            <a:r>
+              <a:rPr lang="en-US" sz="4000" dirty="0" smtClean="0"/>
+              <a:t>7 – Must </a:t>
+            </a:r>
+            <a:r>
+              <a:rPr lang="en-US" sz="4000" dirty="0"/>
+              <a:t>be easily installed and </a:t>
+            </a:r>
+            <a:r>
+              <a:rPr lang="en-US" sz="4000" dirty="0" smtClean="0"/>
+              <a:t>enhanced by other developers</a:t>
+            </a:r>
+            <a:endParaRPr lang="en-US" sz="4000" dirty="0"/>
+          </a:p>
+        </p:txBody>
+      </p:sp>
+      <p:sp>
+        <p:nvSpPr>
+          <p:cNvPr id="48" name="TextBox 47"/>
           <p:cNvSpPr txBox="1"/>
           <p:nvPr/>
         </p:nvSpPr>
         <p:spPr>
           <a:xfrm>
-            <a:off x="615215" y="20513360"/>
-            <a:ext cx="9509760" cy="1938992"/>
+            <a:off x="11520847" y="21570673"/>
+            <a:ext cx="9971563" cy="922843"/>
           </a:xfrm>
           <a:prstGeom prst="rect">
             <a:avLst/>
@@ -5097,60 +5101,12 @@
           </a:bodyPr>
           <a:lstStyle/>
           <a:p>
-            <a:r>
-              <a:rPr lang="en-US" sz="4000" dirty="0" err="1" smtClean="0"/>
-              <a:t>Req</a:t>
-            </a:r>
-            <a:r>
-              <a:rPr lang="en-US" sz="4000" dirty="0" smtClean="0"/>
-              <a:t> 1 – </a:t>
-            </a:r>
-          </a:p>
-          <a:p>
-            <a:r>
-              <a:rPr lang="en-US" sz="4000" dirty="0" err="1" smtClean="0"/>
-              <a:t>Req</a:t>
-            </a:r>
-            <a:r>
-              <a:rPr lang="en-US" sz="4000" dirty="0" smtClean="0"/>
-              <a:t> 2 –</a:t>
-            </a:r>
-          </a:p>
-          <a:p>
-            <a:endParaRPr lang="en-US" sz="4000" dirty="0"/>
-          </a:p>
-        </p:txBody>
-      </p:sp>
-      <p:sp>
-        <p:nvSpPr>
-          <p:cNvPr id="48" name="TextBox 47"/>
-          <p:cNvSpPr txBox="1"/>
-          <p:nvPr/>
-        </p:nvSpPr>
-        <p:spPr>
-          <a:xfrm>
-            <a:off x="11768487" y="22280825"/>
-            <a:ext cx="9509760" cy="1687898"/>
-          </a:xfrm>
-          <a:prstGeom prst="rect">
-            <a:avLst/>
-          </a:prstGeom>
-          <a:noFill/>
-        </p:spPr>
-        <p:txBody>
-          <a:bodyPr wrap="square" rtlCol="0">
-            <a:spAutoFit/>
-          </a:bodyPr>
-          <a:lstStyle/>
-          <a:p>
+            <a:pPr algn="ctr"/>
             <a:r>
               <a:rPr lang="en-US" dirty="0" smtClean="0"/>
-              <a:t>Screenshots</a:t>
+              <a:t>Student</a:t>
             </a:r>
             <a:endParaRPr lang="en-US" dirty="0" smtClean="0"/>
-          </a:p>
-          <a:p>
-            <a:endParaRPr lang="en-US" dirty="0"/>
           </a:p>
         </p:txBody>
       </p:sp>
@@ -5202,6 +5158,456 @@
           </a:prstGeom>
         </p:spPr>
       </p:pic>
+      <p:sp>
+        <p:nvSpPr>
+          <p:cNvPr id="41" name="TextBox 40"/>
+          <p:cNvSpPr txBox="1"/>
+          <p:nvPr/>
+        </p:nvSpPr>
+        <p:spPr>
+          <a:xfrm>
+            <a:off x="11502191" y="25022246"/>
+            <a:ext cx="9976184" cy="922843"/>
+          </a:xfrm>
+          <a:prstGeom prst="rect">
+            <a:avLst/>
+          </a:prstGeom>
+          <a:noFill/>
+        </p:spPr>
+        <p:txBody>
+          <a:bodyPr wrap="square" rtlCol="0">
+            <a:spAutoFit/>
+          </a:bodyPr>
+          <a:lstStyle/>
+          <a:p>
+            <a:pPr algn="ctr"/>
+            <a:r>
+              <a:rPr lang="en-US" dirty="0" smtClean="0"/>
+              <a:t>Instructor</a:t>
+            </a:r>
+            <a:endParaRPr lang="en-US" dirty="0" smtClean="0"/>
+          </a:p>
+        </p:txBody>
+      </p:sp>
+      <p:sp>
+        <p:nvSpPr>
+          <p:cNvPr id="44" name="TextBox 43"/>
+          <p:cNvSpPr txBox="1"/>
+          <p:nvPr/>
+        </p:nvSpPr>
+        <p:spPr>
+          <a:xfrm>
+            <a:off x="11502191" y="28733823"/>
+            <a:ext cx="9990220" cy="3352328"/>
+          </a:xfrm>
+          <a:prstGeom prst="rect">
+            <a:avLst/>
+          </a:prstGeom>
+          <a:noFill/>
+        </p:spPr>
+        <p:txBody>
+          <a:bodyPr wrap="square" rtlCol="0">
+            <a:spAutoFit/>
+          </a:bodyPr>
+          <a:lstStyle/>
+          <a:p>
+            <a:pPr algn="ctr"/>
+            <a:r>
+              <a:rPr lang="en-US" dirty="0" smtClean="0"/>
+              <a:t>Summary</a:t>
+            </a:r>
+          </a:p>
+          <a:p>
+            <a:r>
+              <a:rPr lang="en-US" sz="4000" dirty="0" smtClean="0"/>
+              <a:t>The project is functional, has no static analysis findings, and scales well.  </a:t>
+            </a:r>
+            <a:r>
+              <a:rPr lang="en-US" sz="4000" dirty="0" smtClean="0"/>
+              <a:t>Meets</a:t>
+            </a:r>
+            <a:r>
+              <a:rPr lang="en-US" sz="4000" dirty="0" smtClean="0"/>
+              <a:t> requirements, but this application needs to be further developed to be useful for other Universities.</a:t>
+            </a:r>
+            <a:endParaRPr lang="en-US" sz="4000" dirty="0" smtClean="0"/>
+          </a:p>
+        </p:txBody>
+      </p:sp>
+      <p:sp>
+        <p:nvSpPr>
+          <p:cNvPr id="50" name="TextBox 49"/>
+          <p:cNvSpPr txBox="1"/>
+          <p:nvPr/>
+        </p:nvSpPr>
+        <p:spPr>
+          <a:xfrm>
+            <a:off x="11502190" y="12558512"/>
+            <a:ext cx="9971563" cy="922843"/>
+          </a:xfrm>
+          <a:prstGeom prst="rect">
+            <a:avLst/>
+          </a:prstGeom>
+          <a:noFill/>
+        </p:spPr>
+        <p:txBody>
+          <a:bodyPr wrap="square" rtlCol="0">
+            <a:spAutoFit/>
+          </a:bodyPr>
+          <a:lstStyle/>
+          <a:p>
+            <a:pPr algn="ctr"/>
+            <a:r>
+              <a:rPr lang="en-US" dirty="0" smtClean="0"/>
+              <a:t>Components</a:t>
+            </a:r>
+            <a:endParaRPr lang="en-US" dirty="0" smtClean="0"/>
+          </a:p>
+        </p:txBody>
+      </p:sp>
+      <p:sp>
+        <p:nvSpPr>
+          <p:cNvPr id="51" name="TextBox 50"/>
+          <p:cNvSpPr txBox="1"/>
+          <p:nvPr/>
+        </p:nvSpPr>
+        <p:spPr>
+          <a:xfrm>
+            <a:off x="11483534" y="16008273"/>
+            <a:ext cx="9976184" cy="3967881"/>
+          </a:xfrm>
+          <a:prstGeom prst="rect">
+            <a:avLst/>
+          </a:prstGeom>
+          <a:noFill/>
+        </p:spPr>
+        <p:txBody>
+          <a:bodyPr wrap="square" numCol="1" rtlCol="0">
+            <a:spAutoFit/>
+          </a:bodyPr>
+          <a:lstStyle/>
+          <a:p>
+            <a:pPr algn="ctr"/>
+            <a:r>
+              <a:rPr lang="en-US" dirty="0" smtClean="0"/>
+              <a:t>Database</a:t>
+            </a:r>
+          </a:p>
+          <a:p>
+            <a:r>
+              <a:rPr lang="en-US" sz="4000" dirty="0"/>
+              <a:t> </a:t>
+            </a:r>
+            <a:r>
+              <a:rPr lang="en-US" sz="4000" dirty="0" smtClean="0"/>
+              <a:t>      Classes</a:t>
+            </a:r>
+          </a:p>
+          <a:p>
+            <a:r>
+              <a:rPr lang="en-US" sz="4000" dirty="0" smtClean="0"/>
+              <a:t>       Exercises</a:t>
+            </a:r>
+          </a:p>
+          <a:p>
+            <a:r>
+              <a:rPr lang="en-US" sz="4000" dirty="0" smtClean="0"/>
+              <a:t>       Submissions</a:t>
+            </a:r>
+          </a:p>
+          <a:p>
+            <a:r>
+              <a:rPr lang="en-US" sz="4000" dirty="0" smtClean="0"/>
+              <a:t>       Users</a:t>
+            </a:r>
+          </a:p>
+          <a:p>
+            <a:r>
+              <a:rPr lang="en-US" sz="4000" dirty="0" smtClean="0"/>
+              <a:t>       Settings</a:t>
+            </a:r>
+          </a:p>
+        </p:txBody>
+      </p:sp>
+      <p:pic>
+        <p:nvPicPr>
+          <p:cNvPr id="52" name="Picture 2" descr="https://github.com/so87/Security-Lab-Manager/raw/dev/documentation/high-level-design.PNG"/>
+          <p:cNvPicPr>
+            <a:picLocks noChangeAspect="1" noChangeArrowheads="1"/>
+          </p:cNvPicPr>
+          <p:nvPr/>
+        </p:nvPicPr>
+        <p:blipFill>
+          <a:blip r:embed="rId7" cstate="print">
+            <a:extLst>
+              <a:ext uri="{28A0092B-C50C-407E-A947-70E740481C1C}">
+                <a14:useLocalDpi xmlns:a14="http://schemas.microsoft.com/office/drawing/2010/main" val="0"/>
+              </a:ext>
+            </a:extLst>
+          </a:blip>
+          <a:srcRect/>
+          <a:stretch>
+            <a:fillRect/>
+          </a:stretch>
+        </p:blipFill>
+        <p:spPr bwMode="auto">
+          <a:xfrm>
+            <a:off x="11554327" y="13734372"/>
+            <a:ext cx="3170076" cy="2433689"/>
+          </a:xfrm>
+          <a:prstGeom prst="rect">
+            <a:avLst/>
+          </a:prstGeom>
+          <a:noFill/>
+          <a:extLst>
+            <a:ext uri="{909E8E84-426E-40DD-AFC4-6F175D3DCCD1}">
+              <a14:hiddenFill xmlns:a14="http://schemas.microsoft.com/office/drawing/2010/main">
+                <a:solidFill>
+                  <a:srgbClr val="FFFFFF"/>
+                </a:solidFill>
+              </a14:hiddenFill>
+            </a:ext>
+          </a:extLst>
+        </p:spPr>
+      </p:pic>
+      <p:pic>
+        <p:nvPicPr>
+          <p:cNvPr id="3" name="Picture 2"/>
+          <p:cNvPicPr>
+            <a:picLocks noChangeAspect="1"/>
+          </p:cNvPicPr>
+          <p:nvPr/>
+        </p:nvPicPr>
+        <p:blipFill>
+          <a:blip r:embed="rId8"/>
+          <a:stretch>
+            <a:fillRect/>
+          </a:stretch>
+        </p:blipFill>
+        <p:spPr>
+          <a:xfrm>
+            <a:off x="12129237" y="22270533"/>
+            <a:ext cx="8626191" cy="2942803"/>
+          </a:xfrm>
+          <a:prstGeom prst="rect">
+            <a:avLst/>
+          </a:prstGeom>
+        </p:spPr>
+      </p:pic>
+      <p:pic>
+        <p:nvPicPr>
+          <p:cNvPr id="5" name="Picture 4"/>
+          <p:cNvPicPr>
+            <a:picLocks noChangeAspect="1"/>
+          </p:cNvPicPr>
+          <p:nvPr/>
+        </p:nvPicPr>
+        <p:blipFill>
+          <a:blip r:embed="rId9"/>
+          <a:stretch>
+            <a:fillRect/>
+          </a:stretch>
+        </p:blipFill>
+        <p:spPr>
+          <a:xfrm>
+            <a:off x="12129236" y="25696733"/>
+            <a:ext cx="8626191" cy="3078499"/>
+          </a:xfrm>
+          <a:prstGeom prst="rect">
+            <a:avLst/>
+          </a:prstGeom>
+        </p:spPr>
+      </p:pic>
+      <p:pic>
+        <p:nvPicPr>
+          <p:cNvPr id="1026" name="Picture 2" descr="https://github.com/so87/Security-Lab-Manager/raw/dev/documentation/dev-deploy-process.PNG"/>
+          <p:cNvPicPr>
+            <a:picLocks noChangeAspect="1" noChangeArrowheads="1"/>
+          </p:cNvPicPr>
+          <p:nvPr/>
+        </p:nvPicPr>
+        <p:blipFill>
+          <a:blip r:embed="rId10">
+            <a:extLst>
+              <a:ext uri="{28A0092B-C50C-407E-A947-70E740481C1C}">
+                <a14:useLocalDpi xmlns:a14="http://schemas.microsoft.com/office/drawing/2010/main" val="0"/>
+              </a:ext>
+            </a:extLst>
+          </a:blip>
+          <a:srcRect/>
+          <a:stretch>
+            <a:fillRect/>
+          </a:stretch>
+        </p:blipFill>
+        <p:spPr bwMode="auto">
+          <a:xfrm>
+            <a:off x="18152156" y="13734722"/>
+            <a:ext cx="3340254" cy="1804019"/>
+          </a:xfrm>
+          <a:prstGeom prst="rect">
+            <a:avLst/>
+          </a:prstGeom>
+          <a:noFill/>
+          <a:extLst>
+            <a:ext uri="{909E8E84-426E-40DD-AFC4-6F175D3DCCD1}">
+              <a14:hiddenFill xmlns:a14="http://schemas.microsoft.com/office/drawing/2010/main">
+                <a:solidFill>
+                  <a:srgbClr val="FFFFFF"/>
+                </a:solidFill>
+              </a14:hiddenFill>
+            </a:ext>
+          </a:extLst>
+        </p:spPr>
+      </p:pic>
+      <p:pic>
+        <p:nvPicPr>
+          <p:cNvPr id="6" name="Picture 5"/>
+          <p:cNvPicPr>
+            <a:picLocks noChangeAspect="1"/>
+          </p:cNvPicPr>
+          <p:nvPr/>
+        </p:nvPicPr>
+        <p:blipFill>
+          <a:blip r:embed="rId11"/>
+          <a:stretch>
+            <a:fillRect/>
+          </a:stretch>
+        </p:blipFill>
+        <p:spPr>
+          <a:xfrm>
+            <a:off x="14693985" y="14043928"/>
+            <a:ext cx="3413445" cy="1087542"/>
+          </a:xfrm>
+          <a:prstGeom prst="rect">
+            <a:avLst/>
+          </a:prstGeom>
+        </p:spPr>
+      </p:pic>
+      <p:pic>
+        <p:nvPicPr>
+          <p:cNvPr id="11" name="Picture 10"/>
+          <p:cNvPicPr>
+            <a:picLocks noChangeAspect="1"/>
+          </p:cNvPicPr>
+          <p:nvPr/>
+        </p:nvPicPr>
+        <p:blipFill>
+          <a:blip r:embed="rId12"/>
+          <a:stretch>
+            <a:fillRect/>
+          </a:stretch>
+        </p:blipFill>
+        <p:spPr>
+          <a:xfrm>
+            <a:off x="16253927" y="17036594"/>
+            <a:ext cx="4902001" cy="3145900"/>
+          </a:xfrm>
+          <a:prstGeom prst="rect">
+            <a:avLst/>
+          </a:prstGeom>
+        </p:spPr>
+      </p:pic>
+      <p:sp>
+        <p:nvSpPr>
+          <p:cNvPr id="16" name="TextBox 15"/>
+          <p:cNvSpPr txBox="1"/>
+          <p:nvPr/>
+        </p:nvSpPr>
+        <p:spPr>
+          <a:xfrm>
+            <a:off x="12438556" y="13270677"/>
+            <a:ext cx="1543050" cy="523220"/>
+          </a:xfrm>
+          <a:prstGeom prst="rect">
+            <a:avLst/>
+          </a:prstGeom>
+          <a:noFill/>
+        </p:spPr>
+        <p:txBody>
+          <a:bodyPr wrap="square" rtlCol="0">
+            <a:spAutoFit/>
+          </a:bodyPr>
+          <a:lstStyle/>
+          <a:p>
+            <a:pPr algn="ctr"/>
+            <a:r>
+              <a:rPr lang="en-US" sz="2800" dirty="0" smtClean="0"/>
+              <a:t>Internals</a:t>
+            </a:r>
+            <a:endParaRPr lang="en-US" sz="2800" dirty="0"/>
+          </a:p>
+        </p:txBody>
+      </p:sp>
+      <p:sp>
+        <p:nvSpPr>
+          <p:cNvPr id="53" name="TextBox 52"/>
+          <p:cNvSpPr txBox="1"/>
+          <p:nvPr/>
+        </p:nvSpPr>
+        <p:spPr>
+          <a:xfrm>
+            <a:off x="15038434" y="13271616"/>
+            <a:ext cx="3091359" cy="523220"/>
+          </a:xfrm>
+          <a:prstGeom prst="rect">
+            <a:avLst/>
+          </a:prstGeom>
+          <a:noFill/>
+        </p:spPr>
+        <p:txBody>
+          <a:bodyPr wrap="square" rtlCol="0">
+            <a:spAutoFit/>
+          </a:bodyPr>
+          <a:lstStyle/>
+          <a:p>
+            <a:pPr algn="ctr"/>
+            <a:r>
+              <a:rPr lang="en-US" sz="2800" dirty="0" err="1" smtClean="0"/>
+              <a:t>Gunicorn</a:t>
+            </a:r>
+            <a:r>
+              <a:rPr lang="en-US" sz="2800" dirty="0"/>
+              <a:t> </a:t>
+            </a:r>
+            <a:r>
+              <a:rPr lang="en-US" sz="2800" dirty="0" smtClean="0"/>
+              <a:t>- Browser</a:t>
+            </a:r>
+            <a:endParaRPr lang="en-US" sz="2800" dirty="0"/>
+          </a:p>
+        </p:txBody>
+      </p:sp>
+      <p:sp>
+        <p:nvSpPr>
+          <p:cNvPr id="54" name="TextBox 53"/>
+          <p:cNvSpPr txBox="1"/>
+          <p:nvPr/>
+        </p:nvSpPr>
+        <p:spPr>
+          <a:xfrm>
+            <a:off x="18368359" y="13271462"/>
+            <a:ext cx="3091359" cy="523220"/>
+          </a:xfrm>
+          <a:prstGeom prst="rect">
+            <a:avLst/>
+          </a:prstGeom>
+          <a:noFill/>
+        </p:spPr>
+        <p:txBody>
+          <a:bodyPr wrap="square" rtlCol="0">
+            <a:spAutoFit/>
+          </a:bodyPr>
+          <a:lstStyle/>
+          <a:p>
+            <a:pPr algn="ctr"/>
+            <a:r>
+              <a:rPr lang="en-US" sz="2800" dirty="0" smtClean="0"/>
+              <a:t>Network Setup</a:t>
+            </a:r>
+            <a:endParaRPr lang="en-US" sz="2800" dirty="0"/>
+          </a:p>
+        </p:txBody>
+      </p:sp>
     </p:spTree>
     <p:extLst>
       <p:ext uri="{BB962C8B-B14F-4D97-AF65-F5344CB8AC3E}">
@@ -6025,7 +6431,7 @@
 </file>
 
 <file path=customXml/itemProps2.xml><?xml version="1.0" encoding="utf-8"?>
-<ds:datastoreItem xmlns:ds="http://schemas.openxmlformats.org/officeDocument/2006/customXml" ds:itemID="{BA633446-2620-482C-A8D1-407432FD6C9E}">
+<ds:datastoreItem xmlns:ds="http://schemas.openxmlformats.org/officeDocument/2006/customXml" ds:itemID="{2EF28B04-7BD9-4708-B545-D41AE94ED983}">
   <ds:schemaRefs>
     <ds:schemaRef ds:uri="http://www.w3.org/2001/XMLSchema"/>
     <ds:schemaRef ds:uri="http://www.boldonjames.com/2008/01/sie/internal/label"/>

</xml_diff>

<commit_message>
updated documentation. poster done
</commit_message>
<xml_diff>
--- a/documentation/poster.pptx
+++ b/documentation/poster.pptx
@@ -200,7 +200,7 @@
           <a:p>
             <a:fld id="{7A742C25-6B9D-4BBC-B963-7C0051B7F1C0}" type="datetimeFigureOut">
               <a:rPr lang="en-US" smtClean="0"/>
-              <a:t>3/31/2019</a:t>
+              <a:t>4/5/2019</a:t>
             </a:fld>
             <a:endParaRPr lang="en-US"/>
           </a:p>
@@ -365,7 +365,7 @@
           <a:p>
             <a:fld id="{6337218B-FAD9-4329-997D-1F8E36863CDC}" type="datetimeFigureOut">
               <a:rPr lang="en-US" smtClean="0"/>
-              <a:t>3/31/2019</a:t>
+              <a:t>4/5/2019</a:t>
             </a:fld>
             <a:endParaRPr lang="en-US"/>
           </a:p>
@@ -892,7 +892,7 @@
           <a:p>
             <a:fld id="{D2033A72-562D-473B-B2EC-CFF4CA1A8D42}" type="datetimeFigureOut">
               <a:rPr lang="en-US" smtClean="0"/>
-              <a:t>3/31/2019</a:t>
+              <a:t>4/5/2019</a:t>
             </a:fld>
             <a:endParaRPr lang="en-US"/>
           </a:p>
@@ -1062,7 +1062,7 @@
           <a:p>
             <a:fld id="{D2033A72-562D-473B-B2EC-CFF4CA1A8D42}" type="datetimeFigureOut">
               <a:rPr lang="en-US" smtClean="0"/>
-              <a:t>3/31/2019</a:t>
+              <a:t>4/5/2019</a:t>
             </a:fld>
             <a:endParaRPr lang="en-US"/>
           </a:p>
@@ -1242,7 +1242,7 @@
           <a:p>
             <a:fld id="{D2033A72-562D-473B-B2EC-CFF4CA1A8D42}" type="datetimeFigureOut">
               <a:rPr lang="en-US" smtClean="0"/>
-              <a:t>3/31/2019</a:t>
+              <a:t>4/5/2019</a:t>
             </a:fld>
             <a:endParaRPr lang="en-US"/>
           </a:p>
@@ -1412,7 +1412,7 @@
           <a:p>
             <a:fld id="{D2033A72-562D-473B-B2EC-CFF4CA1A8D42}" type="datetimeFigureOut">
               <a:rPr lang="en-US" smtClean="0"/>
-              <a:t>3/31/2019</a:t>
+              <a:t>4/5/2019</a:t>
             </a:fld>
             <a:endParaRPr lang="en-US"/>
           </a:p>
@@ -1656,7 +1656,7 @@
           <a:p>
             <a:fld id="{D2033A72-562D-473B-B2EC-CFF4CA1A8D42}" type="datetimeFigureOut">
               <a:rPr lang="en-US" smtClean="0"/>
-              <a:t>3/31/2019</a:t>
+              <a:t>4/5/2019</a:t>
             </a:fld>
             <a:endParaRPr lang="en-US"/>
           </a:p>
@@ -1888,7 +1888,7 @@
           <a:p>
             <a:fld id="{D2033A72-562D-473B-B2EC-CFF4CA1A8D42}" type="datetimeFigureOut">
               <a:rPr lang="en-US" smtClean="0"/>
-              <a:t>3/31/2019</a:t>
+              <a:t>4/5/2019</a:t>
             </a:fld>
             <a:endParaRPr lang="en-US"/>
           </a:p>
@@ -2255,7 +2255,7 @@
           <a:p>
             <a:fld id="{D2033A72-562D-473B-B2EC-CFF4CA1A8D42}" type="datetimeFigureOut">
               <a:rPr lang="en-US" smtClean="0"/>
-              <a:t>3/31/2019</a:t>
+              <a:t>4/5/2019</a:t>
             </a:fld>
             <a:endParaRPr lang="en-US"/>
           </a:p>
@@ -2373,7 +2373,7 @@
           <a:p>
             <a:fld id="{D2033A72-562D-473B-B2EC-CFF4CA1A8D42}" type="datetimeFigureOut">
               <a:rPr lang="en-US" smtClean="0"/>
-              <a:t>3/31/2019</a:t>
+              <a:t>4/5/2019</a:t>
             </a:fld>
             <a:endParaRPr lang="en-US"/>
           </a:p>
@@ -2468,7 +2468,7 @@
           <a:p>
             <a:fld id="{D2033A72-562D-473B-B2EC-CFF4CA1A8D42}" type="datetimeFigureOut">
               <a:rPr lang="en-US" smtClean="0"/>
-              <a:t>3/31/2019</a:t>
+              <a:t>4/5/2019</a:t>
             </a:fld>
             <a:endParaRPr lang="en-US"/>
           </a:p>
@@ -2745,7 +2745,7 @@
           <a:p>
             <a:fld id="{D2033A72-562D-473B-B2EC-CFF4CA1A8D42}" type="datetimeFigureOut">
               <a:rPr lang="en-US" smtClean="0"/>
-              <a:t>3/31/2019</a:t>
+              <a:t>4/5/2019</a:t>
             </a:fld>
             <a:endParaRPr lang="en-US"/>
           </a:p>
@@ -3002,7 +3002,7 @@
           <a:p>
             <a:fld id="{D2033A72-562D-473B-B2EC-CFF4CA1A8D42}" type="datetimeFigureOut">
               <a:rPr lang="en-US" smtClean="0"/>
-              <a:t>3/31/2019</a:t>
+              <a:t>4/5/2019</a:t>
             </a:fld>
             <a:endParaRPr lang="en-US"/>
           </a:p>
@@ -3215,7 +3215,7 @@
           <a:p>
             <a:fld id="{D2033A72-562D-473B-B2EC-CFF4CA1A8D42}" type="datetimeFigureOut">
               <a:rPr lang="en-US" smtClean="0"/>
-              <a:t>3/31/2019</a:t>
+              <a:t>4/5/2019</a:t>
             </a:fld>
             <a:endParaRPr lang="en-US"/>
           </a:p>
@@ -3642,8 +3642,8 @@
         </p:blipFill>
         <p:spPr>
           <a:xfrm>
-            <a:off x="7434605" y="28140546"/>
-            <a:ext cx="3690595" cy="3690595"/>
+            <a:off x="7808608" y="29625984"/>
+            <a:ext cx="2809755" cy="3120966"/>
           </a:xfrm>
           <a:prstGeom prst="rect">
             <a:avLst/>
@@ -3665,7 +3665,7 @@
             <a:avLst/>
           </a:prstGeom>
           <a:solidFill>
-            <a:srgbClr val="7030A0"/>
+            <a:srgbClr val="58267E"/>
           </a:solidFill>
         </p:spPr>
         <p:style>
@@ -3715,8 +3715,8 @@
         </p:blipFill>
         <p:spPr>
           <a:xfrm>
-            <a:off x="477253" y="29748355"/>
-            <a:ext cx="6910213" cy="2636176"/>
+            <a:off x="401054" y="30914083"/>
+            <a:ext cx="3904424" cy="1489498"/>
           </a:xfrm>
           <a:prstGeom prst="rect">
             <a:avLst/>
@@ -3731,8 +3731,8 @@
         </p:nvSpPr>
         <p:spPr>
           <a:xfrm>
-            <a:off x="640080" y="2335869"/>
-            <a:ext cx="21305520" cy="1569660"/>
+            <a:off x="0" y="2335869"/>
+            <a:ext cx="21945600" cy="1569660"/>
           </a:xfrm>
           <a:prstGeom prst="rect">
             <a:avLst/>
@@ -3858,7 +3858,25 @@
                 </a:solidFill>
                 <a:latin typeface="Berlin Sans FB" panose="020E0602020502020306" pitchFamily="34" charset="0"/>
               </a:rPr>
-              <a:t>Developed by Simon Owens		     Advisor/Sponsor: Mr. Mark Randall</a:t>
+              <a:t>Developed by Simon Owens		     </a:t>
+            </a:r>
+            <a:r>
+              <a:rPr lang="en-US" sz="4800" dirty="0" smtClean="0">
+                <a:solidFill>
+                  <a:schemeClr val="bg1"/>
+                </a:solidFill>
+                <a:latin typeface="Berlin Sans FB" panose="020E0602020502020306" pitchFamily="34" charset="0"/>
+              </a:rPr>
+              <a:t>  Advisor/Sponsor</a:t>
+            </a:r>
+            <a:r>
+              <a:rPr lang="en-US" sz="4800" dirty="0" smtClean="0">
+                <a:solidFill>
+                  <a:schemeClr val="bg1"/>
+                </a:solidFill>
+                <a:latin typeface="Berlin Sans FB" panose="020E0602020502020306" pitchFamily="34" charset="0"/>
+              </a:rPr>
+              <a:t>: Mr. Mark Randall</a:t>
             </a:r>
           </a:p>
           <a:p>
@@ -3887,7 +3905,25 @@
                 </a:solidFill>
                 <a:latin typeface="Berlin Sans FB" panose="020E0602020502020306" pitchFamily="34" charset="0"/>
               </a:rPr>
-              <a:t>                             University of Evansville</a:t>
+              <a:t>                             </a:t>
+            </a:r>
+            <a:r>
+              <a:rPr lang="en-US" sz="4800" dirty="0" smtClean="0">
+                <a:solidFill>
+                  <a:schemeClr val="bg1"/>
+                </a:solidFill>
+                <a:latin typeface="Berlin Sans FB" panose="020E0602020502020306" pitchFamily="34" charset="0"/>
+              </a:rPr>
+              <a:t>  University </a:t>
+            </a:r>
+            <a:r>
+              <a:rPr lang="en-US" sz="4800" dirty="0" smtClean="0">
+                <a:solidFill>
+                  <a:schemeClr val="bg1"/>
+                </a:solidFill>
+                <a:latin typeface="Berlin Sans FB" panose="020E0602020502020306" pitchFamily="34" charset="0"/>
+              </a:rPr>
+              <a:t>of Evansville</a:t>
             </a:r>
           </a:p>
         </p:txBody>
@@ -3900,7 +3936,7 @@
         </p:nvSpPr>
         <p:spPr>
           <a:xfrm>
-            <a:off x="152400" y="717888"/>
+            <a:off x="0" y="717888"/>
             <a:ext cx="21945600" cy="1569660"/>
           </a:xfrm>
           <a:prstGeom prst="rect">
@@ -4016,7 +4052,16 @@
                 </a:solidFill>
                 <a:latin typeface="Bauhaus 93" panose="04030905020B02020C02" pitchFamily="82" charset="0"/>
               </a:rPr>
-              <a:t>Security Lab Manager</a:t>
+              <a:t> Security </a:t>
+            </a:r>
+            <a:r>
+              <a:rPr lang="en-US" sz="9600" dirty="0" smtClean="0">
+                <a:solidFill>
+                  <a:schemeClr val="bg1"/>
+                </a:solidFill>
+                <a:latin typeface="Bauhaus 93" panose="04030905020B02020C02" pitchFamily="82" charset="0"/>
+              </a:rPr>
+              <a:t>Lab Manager</a:t>
             </a:r>
             <a:endParaRPr lang="en-US" sz="9600" dirty="0">
               <a:solidFill>
@@ -4079,7 +4124,7 @@
         <p:spPr>
           <a:xfrm>
             <a:off x="401054" y="5387406"/>
-            <a:ext cx="10042357" cy="6114783"/>
+            <a:ext cx="10042357" cy="6285070"/>
           </a:xfrm>
           <a:prstGeom prst="rect">
             <a:avLst/>
@@ -4128,7 +4173,7 @@
             <a:avLst/>
           </a:prstGeom>
           <a:solidFill>
-            <a:srgbClr val="7030A0"/>
+            <a:srgbClr val="58267E"/>
           </a:solidFill>
         </p:spPr>
         <p:style>
@@ -4164,8 +4209,8 @@
         </p:nvSpPr>
         <p:spPr>
           <a:xfrm>
-            <a:off x="11502190" y="5387405"/>
-            <a:ext cx="9990220" cy="5778864"/>
+            <a:off x="11502190" y="5387404"/>
+            <a:ext cx="9990220" cy="5806043"/>
           </a:xfrm>
           <a:prstGeom prst="rect">
             <a:avLst/>
@@ -4214,7 +4259,7 @@
             <a:avLst/>
           </a:prstGeom>
           <a:solidFill>
-            <a:srgbClr val="7030A0"/>
+            <a:srgbClr val="58267E"/>
           </a:solidFill>
         </p:spPr>
         <p:style>
@@ -4286,7 +4331,7 @@
         <p:spPr>
           <a:xfrm>
             <a:off x="401054" y="13165131"/>
-            <a:ext cx="10042357" cy="5000949"/>
+            <a:ext cx="10042357" cy="5286645"/>
           </a:xfrm>
           <a:prstGeom prst="rect">
             <a:avLst/>
@@ -4335,7 +4380,7 @@
             <a:avLst/>
           </a:prstGeom>
           <a:solidFill>
-            <a:srgbClr val="7030A0"/>
+            <a:srgbClr val="58267E"/>
           </a:solidFill>
         </p:spPr>
         <p:style>
@@ -4421,7 +4466,7 @@
             <a:avLst/>
           </a:prstGeom>
           <a:solidFill>
-            <a:srgbClr val="7030A0"/>
+            <a:srgbClr val="58267E"/>
           </a:solidFill>
         </p:spPr>
         <p:style>
@@ -4458,7 +4503,7 @@
         <p:spPr>
           <a:xfrm>
             <a:off x="401053" y="18942392"/>
-            <a:ext cx="10042357" cy="10029650"/>
+            <a:ext cx="10042357" cy="11700654"/>
           </a:xfrm>
           <a:prstGeom prst="rect">
             <a:avLst/>
@@ -4507,7 +4552,7 @@
             <a:avLst/>
           </a:prstGeom>
           <a:solidFill>
-            <a:srgbClr val="7030A0"/>
+            <a:srgbClr val="58267E"/>
           </a:solidFill>
         </p:spPr>
         <p:style>
@@ -4593,7 +4638,7 @@
             <a:avLst/>
           </a:prstGeom>
           <a:solidFill>
-            <a:srgbClr val="7030A0"/>
+            <a:srgbClr val="58267E"/>
           </a:solidFill>
         </p:spPr>
         <p:style>
@@ -4629,7 +4674,7 @@
         </p:nvSpPr>
         <p:spPr>
           <a:xfrm>
-            <a:off x="401053" y="5367338"/>
+            <a:off x="401053" y="5381848"/>
             <a:ext cx="10042357" cy="1107996"/>
           </a:xfrm>
           <a:prstGeom prst="rect">
@@ -4692,7 +4737,7 @@
                 </a:solidFill>
                 <a:latin typeface="Berlin Sans FB" panose="020E0602020502020306" pitchFamily="34" charset="0"/>
               </a:rPr>
-              <a:t>DEVELOPMENT</a:t>
+              <a:t>REQUIREMENTS</a:t>
             </a:r>
             <a:endParaRPr lang="en-US" sz="6600" dirty="0">
               <a:solidFill>
@@ -4711,7 +4756,7 @@
         </p:nvSpPr>
         <p:spPr>
           <a:xfrm>
-            <a:off x="348917" y="12166667"/>
+            <a:off x="421487" y="12137642"/>
             <a:ext cx="10042357" cy="1107996"/>
           </a:xfrm>
           <a:prstGeom prst="rect">
@@ -4752,7 +4797,7 @@
         </p:nvSpPr>
         <p:spPr>
           <a:xfrm>
-            <a:off x="11502190" y="11605577"/>
+            <a:off x="11487676" y="11562032"/>
             <a:ext cx="10042357" cy="1107996"/>
           </a:xfrm>
           <a:prstGeom prst="rect">
@@ -4793,7 +4838,7 @@
         </p:nvSpPr>
         <p:spPr>
           <a:xfrm>
-            <a:off x="11676648" y="20448612"/>
+            <a:off x="11487963" y="20477641"/>
             <a:ext cx="10042357" cy="1107996"/>
           </a:xfrm>
           <a:prstGeom prst="rect">
@@ -4834,7 +4879,7 @@
         </p:nvSpPr>
         <p:spPr>
           <a:xfrm>
-            <a:off x="477253" y="18878750"/>
+            <a:off x="404683" y="18936806"/>
             <a:ext cx="10042357" cy="1107996"/>
           </a:xfrm>
           <a:prstGeom prst="rect">
@@ -4856,7 +4901,7 @@
                 </a:solidFill>
                 <a:latin typeface="Berlin Sans FB" panose="020E0602020502020306" pitchFamily="34" charset="0"/>
               </a:rPr>
-              <a:t>REQUIREMENTS</a:t>
+              <a:t>DEVELOPMENT</a:t>
             </a:r>
             <a:endParaRPr lang="en-US" sz="6600" dirty="0">
               <a:solidFill>
@@ -4875,8 +4920,8 @@
         </p:nvSpPr>
         <p:spPr>
           <a:xfrm>
-            <a:off x="640080" y="6766560"/>
-            <a:ext cx="9509760" cy="4401205"/>
+            <a:off x="640080" y="6480810"/>
+            <a:ext cx="9509760" cy="5016758"/>
           </a:xfrm>
           <a:prstGeom prst="rect">
             <a:avLst/>
@@ -4890,31 +4935,86 @@
           <a:lstStyle/>
           <a:p>
             <a:r>
-              <a:rPr lang="en-US" sz="4000" dirty="0" smtClean="0"/>
+              <a:rPr lang="en-US" sz="2400" dirty="0" smtClean="0"/>
               <a:t>The Security Lab Manager is a web application that manages vulnerable virtualization machines for users to practice hacking on.  </a:t>
             </a:r>
             <a:r>
-              <a:rPr lang="en-US" sz="4000" dirty="0"/>
+              <a:rPr lang="en-US" sz="2400" dirty="0"/>
               <a:t>U</a:t>
             </a:r>
             <a:r>
-              <a:rPr lang="en-US" sz="4000" dirty="0" smtClean="0"/>
+              <a:rPr lang="en-US" sz="2400" dirty="0" smtClean="0"/>
               <a:t>sers can start hacking in their own virtual environment.  Administrators can view completed exercises and send grades to users.</a:t>
             </a:r>
-            <a:endParaRPr lang="en-US" sz="4000" dirty="0"/>
-          </a:p>
-        </p:txBody>
-      </p:sp>
-      <p:sp>
-        <p:nvSpPr>
-          <p:cNvPr id="42" name="TextBox 41"/>
+            <a:endParaRPr lang="en-US" sz="2400" dirty="0"/>
+          </a:p>
+          <a:p>
+            <a:r>
+              <a:rPr lang="en-US" sz="2800" b="1" dirty="0" smtClean="0"/>
+              <a:t>Features</a:t>
+            </a:r>
+          </a:p>
+          <a:p>
+            <a:r>
+              <a:rPr lang="en-US" sz="2400" dirty="0" smtClean="0"/>
+              <a:t/>
+            </a:r>
+            <a:br>
+              <a:rPr lang="en-US" sz="2400" dirty="0" smtClean="0"/>
+            </a:br>
+            <a:r>
+              <a:rPr lang="en-US" sz="2400" dirty="0" smtClean="0"/>
+              <a:t/>
+            </a:r>
+            <a:br>
+              <a:rPr lang="en-US" sz="2400" dirty="0" smtClean="0"/>
+            </a:br>
+            <a:endParaRPr lang="en-US" sz="2400" dirty="0" smtClean="0"/>
+          </a:p>
+          <a:p>
+            <a:r>
+              <a:rPr lang="en-US" sz="2800" b="1" dirty="0" smtClean="0"/>
+              <a:t>Software</a:t>
+            </a:r>
+          </a:p>
+          <a:p>
+            <a:r>
+              <a:rPr lang="en-US" sz="2400" dirty="0" smtClean="0"/>
+              <a:t>❏ Front End – JavaScript, JQuery, HTML5, CSS</a:t>
+            </a:r>
+          </a:p>
+          <a:p>
+            <a:r>
+              <a:rPr lang="en-US" sz="2400" dirty="0" smtClean="0"/>
+              <a:t>❏ Back End – Django Framework, Python, Docker SDK, Bash, PostgreSQL</a:t>
+            </a:r>
+          </a:p>
+          <a:p>
+            <a:r>
+              <a:rPr lang="en-US" sz="2400" dirty="0" smtClean="0"/>
+              <a:t>❏ Platform – Docker Linux Containers: Can run and develop on Windows or Linux if </a:t>
+            </a:r>
+            <a:r>
+              <a:rPr lang="en-US" sz="2400" dirty="0"/>
+              <a:t>D</a:t>
+            </a:r>
+            <a:r>
+              <a:rPr lang="en-US" sz="2400" dirty="0" smtClean="0"/>
+              <a:t>ocker is installed</a:t>
+            </a:r>
+          </a:p>
+        </p:txBody>
+      </p:sp>
+      <p:sp>
+        <p:nvSpPr>
+          <p:cNvPr id="45" name="TextBox 44"/>
           <p:cNvSpPr txBox="1"/>
           <p:nvPr/>
         </p:nvSpPr>
         <p:spPr>
           <a:xfrm>
-            <a:off x="11676648" y="6595571"/>
-            <a:ext cx="9479280" cy="4401205"/>
+            <a:off x="640080" y="13260737"/>
+            <a:ext cx="9509760" cy="3046988"/>
           </a:xfrm>
           <a:prstGeom prst="rect">
             <a:avLst/>
@@ -4928,23 +5028,49 @@
           <a:lstStyle/>
           <a:p>
             <a:r>
-              <a:rPr lang="en-US" sz="4000" dirty="0" smtClean="0"/>
-              <a:t>This application was planned and developed using the Agile framework.  DevOps principles of tested driven development, automated test, continuous integration, and continuous deployment were used. The CI/CD pipeline utilized code and web scanners to ensure code is lean and secure.</a:t>
-            </a:r>
-            <a:endParaRPr lang="en-US" sz="4000" dirty="0"/>
-          </a:p>
-        </p:txBody>
-      </p:sp>
-      <p:sp>
-        <p:nvSpPr>
-          <p:cNvPr id="45" name="TextBox 44"/>
+              <a:rPr lang="en-US" sz="2400" dirty="0" smtClean="0"/>
+              <a:t>Security training is desired in all parts of industry: secure coding for developers, Q/A Testers, and Security Engineers.  There are several virtual machines to practice security, but none have a student-teacher model.  </a:t>
+            </a:r>
+            <a:r>
+              <a:rPr lang="en-US" sz="2400" dirty="0"/>
+              <a:t>S</a:t>
+            </a:r>
+            <a:r>
+              <a:rPr lang="en-US" sz="2400" dirty="0" smtClean="0"/>
+              <a:t>tudents can now easily begin learning security</a:t>
+            </a:r>
+            <a:r>
+              <a:rPr lang="en-US" sz="2400" dirty="0"/>
+              <a:t> </a:t>
+            </a:r>
+            <a:r>
+              <a:rPr lang="en-US" sz="2400" dirty="0" smtClean="0"/>
+              <a:t>with just this application</a:t>
+            </a:r>
+            <a:r>
+              <a:rPr lang="en-US" sz="2400" dirty="0" smtClean="0"/>
+              <a:t>.  The table below compares current options for learning security, bring your own device(BYOD), using VMware virtual machines, or this application.</a:t>
+            </a:r>
+            <a:endParaRPr lang="en-US" sz="2400" dirty="0" smtClean="0"/>
+          </a:p>
+          <a:p>
+            <a:endParaRPr lang="en-US" sz="2400" dirty="0"/>
+          </a:p>
+          <a:p>
+            <a:endParaRPr lang="en-US" sz="2400" dirty="0" smtClean="0"/>
+          </a:p>
+        </p:txBody>
+      </p:sp>
+      <p:sp>
+        <p:nvSpPr>
+          <p:cNvPr id="47" name="TextBox 46"/>
           <p:cNvSpPr txBox="1"/>
           <p:nvPr/>
         </p:nvSpPr>
         <p:spPr>
           <a:xfrm>
-            <a:off x="640080" y="13451237"/>
-            <a:ext cx="9509760" cy="4401205"/>
+            <a:off x="11735642" y="6505216"/>
+            <a:ext cx="9509760" cy="3785652"/>
           </a:xfrm>
           <a:prstGeom prst="rect">
             <a:avLst/>
@@ -4958,161 +5084,136 @@
           <a:lstStyle/>
           <a:p>
             <a:r>
-              <a:rPr lang="en-US" sz="4000" dirty="0" smtClean="0"/>
-              <a:t>Security training is desired in all parts of industry: secure coding for developers, Q/A Testers, and Security Engineers.  There are several virtual machines to practice security, but none have a student-teacher model.  </a:t>
-            </a:r>
-            <a:r>
-              <a:rPr lang="en-US" sz="4000" dirty="0"/>
-              <a:t>S</a:t>
-            </a:r>
-            <a:r>
-              <a:rPr lang="en-US" sz="4000" dirty="0" smtClean="0"/>
-              <a:t>tudents can now easily begin learning security</a:t>
-            </a:r>
-            <a:r>
-              <a:rPr lang="en-US" sz="4000" dirty="0"/>
-              <a:t> </a:t>
-            </a:r>
-            <a:r>
-              <a:rPr lang="en-US" sz="4000" dirty="0" smtClean="0"/>
-              <a:t>with just this application.</a:t>
-            </a:r>
-            <a:endParaRPr lang="en-US" sz="4000" dirty="0"/>
-          </a:p>
-        </p:txBody>
-      </p:sp>
-      <p:sp>
-        <p:nvSpPr>
-          <p:cNvPr id="47" name="TextBox 46"/>
-          <p:cNvSpPr txBox="1"/>
-          <p:nvPr/>
-        </p:nvSpPr>
-        <p:spPr>
-          <a:xfrm>
-            <a:off x="615215" y="20513360"/>
-            <a:ext cx="9509760" cy="8094524"/>
-          </a:xfrm>
-          <a:prstGeom prst="rect">
-            <a:avLst/>
-          </a:prstGeom>
-          <a:noFill/>
-        </p:spPr>
-        <p:txBody>
-          <a:bodyPr wrap="square" rtlCol="0">
-            <a:spAutoFit/>
-          </a:bodyPr>
-          <a:lstStyle/>
-          <a:p>
-            <a:r>
-              <a:rPr lang="en-US" sz="4000" dirty="0" smtClean="0"/>
-              <a:t>1 </a:t>
-            </a:r>
-            <a:r>
-              <a:rPr lang="en-US" sz="4000" dirty="0"/>
-              <a:t>–  Student interface for starting, stopping, and restarting exercises.  There should also be a place to submit answers for exercises</a:t>
-            </a:r>
-          </a:p>
-          <a:p>
-            <a:r>
-              <a:rPr lang="en-US" sz="4000" dirty="0" smtClean="0"/>
-              <a:t>2 – Instructor </a:t>
-            </a:r>
-            <a:r>
-              <a:rPr lang="en-US" sz="4000" dirty="0"/>
+              <a:rPr lang="en-US" sz="2400" dirty="0"/>
+              <a:t>❏ </a:t>
+            </a:r>
+            <a:r>
+              <a:rPr lang="en-US" sz="2400" dirty="0" smtClean="0"/>
+              <a:t> Student </a:t>
+            </a:r>
+            <a:r>
+              <a:rPr lang="en-US" sz="2400" dirty="0"/>
+              <a:t>interface for starting, stopping, and restarting exercises.  There should also be a place to submit answers for exercises</a:t>
+            </a:r>
+          </a:p>
+          <a:p>
+            <a:r>
+              <a:rPr lang="en-US" sz="2400" dirty="0"/>
+              <a:t>❏ </a:t>
+            </a:r>
+            <a:r>
+              <a:rPr lang="en-US" sz="2400" dirty="0" smtClean="0"/>
+              <a:t> Instructor </a:t>
+            </a:r>
+            <a:r>
+              <a:rPr lang="en-US" sz="2400" dirty="0"/>
               <a:t>interface for creating, editing, deleting: classes, exercises, students, and managing application performance</a:t>
             </a:r>
           </a:p>
           <a:p>
             <a:r>
-              <a:rPr lang="en-US" sz="4000" dirty="0" smtClean="0"/>
-              <a:t>3 – Instructors </a:t>
-            </a:r>
-            <a:r>
-              <a:rPr lang="en-US" sz="4000" dirty="0"/>
+              <a:rPr lang="en-US" sz="2400" dirty="0"/>
+              <a:t>❏ </a:t>
+            </a:r>
+            <a:r>
+              <a:rPr lang="en-US" sz="2400" dirty="0" smtClean="0"/>
+              <a:t> Instructors </a:t>
+            </a:r>
+            <a:r>
+              <a:rPr lang="en-US" sz="2400" dirty="0"/>
               <a:t>should be able to easily check and email grades</a:t>
             </a:r>
           </a:p>
           <a:p>
             <a:r>
-              <a:rPr lang="en-US" sz="4000" dirty="0" smtClean="0"/>
-              <a:t>4 </a:t>
-            </a:r>
-            <a:r>
-              <a:rPr lang="en-US" sz="4000" dirty="0"/>
-              <a:t>– Must contain 1 web security exercise</a:t>
-            </a:r>
-          </a:p>
-          <a:p>
-            <a:r>
-              <a:rPr lang="en-US" sz="4000" dirty="0" smtClean="0"/>
-              <a:t>5 – Must </a:t>
-            </a:r>
-            <a:r>
-              <a:rPr lang="en-US" sz="4000" dirty="0"/>
-              <a:t>contain 1 desktop security exercise</a:t>
-            </a:r>
-          </a:p>
-          <a:p>
-            <a:r>
-              <a:rPr lang="en-US" sz="4000" dirty="0" smtClean="0"/>
-              <a:t>6 – Must </a:t>
-            </a:r>
-            <a:r>
-              <a:rPr lang="en-US" sz="4000" dirty="0"/>
-              <a:t>be developed securely</a:t>
-            </a:r>
-          </a:p>
-          <a:p>
-            <a:r>
-              <a:rPr lang="en-US" sz="4000" dirty="0" smtClean="0"/>
-              <a:t>7 – Must </a:t>
-            </a:r>
-            <a:r>
-              <a:rPr lang="en-US" sz="4000" dirty="0"/>
+              <a:rPr lang="en-US" sz="2400" dirty="0"/>
+              <a:t>❏ </a:t>
+            </a:r>
+            <a:r>
+              <a:rPr lang="en-US" sz="2400" dirty="0" smtClean="0"/>
+              <a:t> Must </a:t>
+            </a:r>
+            <a:r>
+              <a:rPr lang="en-US" sz="2400" dirty="0"/>
+              <a:t>contain </a:t>
+            </a:r>
+            <a:r>
+              <a:rPr lang="en-US" sz="2400" dirty="0" smtClean="0"/>
+              <a:t>one </a:t>
+            </a:r>
+            <a:r>
+              <a:rPr lang="en-US" sz="2400" dirty="0"/>
+              <a:t>web security exercise</a:t>
+            </a:r>
+          </a:p>
+          <a:p>
+            <a:r>
+              <a:rPr lang="en-US" sz="2400" dirty="0"/>
+              <a:t>❏ </a:t>
+            </a:r>
+            <a:r>
+              <a:rPr lang="en-US" sz="2400" dirty="0" smtClean="0"/>
+              <a:t> Must </a:t>
+            </a:r>
+            <a:r>
+              <a:rPr lang="en-US" sz="2400" dirty="0"/>
+              <a:t>contain </a:t>
+            </a:r>
+            <a:r>
+              <a:rPr lang="en-US" sz="2400" dirty="0" smtClean="0"/>
+              <a:t>one </a:t>
+            </a:r>
+            <a:r>
+              <a:rPr lang="en-US" sz="2400" dirty="0"/>
+              <a:t>desktop security exercise</a:t>
+            </a:r>
+          </a:p>
+          <a:p>
+            <a:r>
+              <a:rPr lang="en-US" sz="2400" dirty="0"/>
+              <a:t>❏ </a:t>
+            </a:r>
+            <a:r>
+              <a:rPr lang="en-US" sz="2400" dirty="0" smtClean="0"/>
+              <a:t> Must </a:t>
+            </a:r>
+            <a:r>
+              <a:rPr lang="en-US" sz="2400" dirty="0"/>
+              <a:t>be developed </a:t>
+            </a:r>
+            <a:r>
+              <a:rPr lang="en-US" sz="2400" dirty="0" smtClean="0"/>
+              <a:t>securely – scan for vulnerabilities and fix them</a:t>
+            </a:r>
+            <a:endParaRPr lang="en-US" sz="2400" dirty="0"/>
+          </a:p>
+          <a:p>
+            <a:r>
+              <a:rPr lang="en-US" sz="2400" dirty="0"/>
+              <a:t>❏ </a:t>
+            </a:r>
+            <a:r>
+              <a:rPr lang="en-US" sz="2400" dirty="0" smtClean="0"/>
+              <a:t> Must </a:t>
+            </a:r>
+            <a:r>
+              <a:rPr lang="en-US" sz="2400" dirty="0"/>
               <a:t>be easily installed and </a:t>
             </a:r>
             <a:r>
-              <a:rPr lang="en-US" sz="4000" dirty="0" smtClean="0"/>
+              <a:rPr lang="en-US" sz="2400" dirty="0" smtClean="0"/>
               <a:t>enhanced by other developers</a:t>
             </a:r>
-            <a:endParaRPr lang="en-US" sz="4000" dirty="0"/>
-          </a:p>
-        </p:txBody>
-      </p:sp>
-      <p:sp>
-        <p:nvSpPr>
-          <p:cNvPr id="48" name="TextBox 47"/>
-          <p:cNvSpPr txBox="1"/>
-          <p:nvPr/>
-        </p:nvSpPr>
-        <p:spPr>
-          <a:xfrm>
-            <a:off x="11520847" y="21570673"/>
-            <a:ext cx="9971563" cy="922843"/>
-          </a:xfrm>
-          <a:prstGeom prst="rect">
-            <a:avLst/>
-          </a:prstGeom>
-          <a:noFill/>
-        </p:spPr>
-        <p:txBody>
-          <a:bodyPr wrap="square" rtlCol="0">
-            <a:spAutoFit/>
-          </a:bodyPr>
-          <a:lstStyle/>
-          <a:p>
-            <a:pPr algn="ctr"/>
-            <a:r>
-              <a:rPr lang="en-US" dirty="0" smtClean="0"/>
-              <a:t>Student</a:t>
-            </a:r>
-            <a:endParaRPr lang="en-US" dirty="0" smtClean="0"/>
+            <a:endParaRPr lang="en-US" sz="2400" dirty="0"/>
+          </a:p>
+          <a:p>
+            <a:endParaRPr lang="en-US" sz="2400" dirty="0"/>
           </a:p>
         </p:txBody>
       </p:sp>
       <p:pic>
         <p:nvPicPr>
-          <p:cNvPr id="49" name="Picture 48"/>
+          <p:cNvPr id="61" name="Picture 60"/>
           <p:cNvPicPr>
             <a:picLocks noChangeAspect="1"/>
           </p:cNvPicPr>
@@ -5126,48 +5227,24 @@
         </p:blipFill>
         <p:spPr>
           <a:xfrm>
-            <a:off x="7627869" y="31329216"/>
-            <a:ext cx="2891741" cy="1003851"/>
+            <a:off x="4659914" y="31680150"/>
+            <a:ext cx="3078587" cy="866626"/>
           </a:xfrm>
           <a:prstGeom prst="rect">
             <a:avLst/>
           </a:prstGeom>
         </p:spPr>
       </p:pic>
-      <p:pic>
-        <p:nvPicPr>
-          <p:cNvPr id="61" name="Picture 60"/>
-          <p:cNvPicPr>
-            <a:picLocks noChangeAspect="1"/>
-          </p:cNvPicPr>
-          <p:nvPr/>
-        </p:nvPicPr>
-        <p:blipFill>
-          <a:blip r:embed="rId6"/>
-          <a:stretch>
-            <a:fillRect/>
-          </a:stretch>
-        </p:blipFill>
-        <p:spPr>
-          <a:xfrm>
-            <a:off x="7495565" y="30402197"/>
-            <a:ext cx="3081588" cy="867471"/>
-          </a:xfrm>
-          <a:prstGeom prst="rect">
-            <a:avLst/>
-          </a:prstGeom>
-        </p:spPr>
-      </p:pic>
-      <p:sp>
-        <p:nvSpPr>
-          <p:cNvPr id="41" name="TextBox 40"/>
+      <p:sp>
+        <p:nvSpPr>
+          <p:cNvPr id="50" name="TextBox 49"/>
           <p:cNvSpPr txBox="1"/>
           <p:nvPr/>
         </p:nvSpPr>
         <p:spPr>
           <a:xfrm>
-            <a:off x="11502191" y="25022246"/>
-            <a:ext cx="9976184" cy="922843"/>
+            <a:off x="11502190" y="12529015"/>
+            <a:ext cx="9971563" cy="922843"/>
           </a:xfrm>
           <a:prstGeom prst="rect">
             <a:avLst/>
@@ -5183,85 +5260,8 @@
             <a:pPr algn="ctr"/>
             <a:r>
               <a:rPr lang="en-US" dirty="0" smtClean="0"/>
-              <a:t>Instructor</a:t>
-            </a:r>
-            <a:endParaRPr lang="en-US" dirty="0" smtClean="0"/>
-          </a:p>
-        </p:txBody>
-      </p:sp>
-      <p:sp>
-        <p:nvSpPr>
-          <p:cNvPr id="44" name="TextBox 43"/>
-          <p:cNvSpPr txBox="1"/>
-          <p:nvPr/>
-        </p:nvSpPr>
-        <p:spPr>
-          <a:xfrm>
-            <a:off x="11502191" y="28733823"/>
-            <a:ext cx="9990220" cy="3352328"/>
-          </a:xfrm>
-          <a:prstGeom prst="rect">
-            <a:avLst/>
-          </a:prstGeom>
-          <a:noFill/>
-        </p:spPr>
-        <p:txBody>
-          <a:bodyPr wrap="square" rtlCol="0">
-            <a:spAutoFit/>
-          </a:bodyPr>
-          <a:lstStyle/>
-          <a:p>
-            <a:pPr algn="ctr"/>
-            <a:r>
-              <a:rPr lang="en-US" dirty="0" smtClean="0"/>
-              <a:t>Summary</a:t>
-            </a:r>
-          </a:p>
-          <a:p>
-            <a:r>
-              <a:rPr lang="en-US" sz="4000" dirty="0" smtClean="0"/>
-              <a:t>The project is functional, has no static analysis findings, and scales well.  </a:t>
-            </a:r>
-            <a:r>
-              <a:rPr lang="en-US" sz="4000" dirty="0" smtClean="0"/>
-              <a:t>Meets</a:t>
-            </a:r>
-            <a:r>
-              <a:rPr lang="en-US" sz="4000" dirty="0" smtClean="0"/>
-              <a:t> requirements, but this application needs to be further developed to be useful for other Universities.</a:t>
-            </a:r>
-            <a:endParaRPr lang="en-US" sz="4000" dirty="0" smtClean="0"/>
-          </a:p>
-        </p:txBody>
-      </p:sp>
-      <p:sp>
-        <p:nvSpPr>
-          <p:cNvPr id="50" name="TextBox 49"/>
-          <p:cNvSpPr txBox="1"/>
-          <p:nvPr/>
-        </p:nvSpPr>
-        <p:spPr>
-          <a:xfrm>
-            <a:off x="11502190" y="12558512"/>
-            <a:ext cx="9971563" cy="922843"/>
-          </a:xfrm>
-          <a:prstGeom prst="rect">
-            <a:avLst/>
-          </a:prstGeom>
-          <a:noFill/>
-        </p:spPr>
-        <p:txBody>
-          <a:bodyPr wrap="square" rtlCol="0">
-            <a:spAutoFit/>
-          </a:bodyPr>
-          <a:lstStyle/>
-          <a:p>
-            <a:pPr algn="ctr"/>
-            <a:r>
-              <a:rPr lang="en-US" dirty="0" smtClean="0"/>
               <a:t>Components</a:t>
             </a:r>
-            <a:endParaRPr lang="en-US" dirty="0" smtClean="0"/>
           </a:p>
         </p:txBody>
       </p:sp>
@@ -5273,8 +5273,8 @@
         </p:nvSpPr>
         <p:spPr>
           <a:xfrm>
-            <a:off x="11483534" y="16008273"/>
-            <a:ext cx="9976184" cy="3967881"/>
+            <a:off x="11788334" y="16008273"/>
+            <a:ext cx="9976184" cy="3352328"/>
           </a:xfrm>
           <a:prstGeom prst="rect">
             <a:avLst/>
@@ -5287,7 +5287,6 @@
           </a:bodyPr>
           <a:lstStyle/>
           <a:p>
-            <a:pPr algn="ctr"/>
             <a:r>
               <a:rPr lang="en-US" dirty="0" smtClean="0"/>
               <a:t>Database</a:t>
@@ -5295,37 +5294,42 @@
           </a:p>
           <a:p>
             <a:r>
-              <a:rPr lang="en-US" sz="4000" dirty="0"/>
-              <a:t> </a:t>
-            </a:r>
-            <a:r>
-              <a:rPr lang="en-US" sz="4000" dirty="0" smtClean="0"/>
-              <a:t>      Classes</a:t>
-            </a:r>
-          </a:p>
-          <a:p>
-            <a:r>
-              <a:rPr lang="en-US" sz="4000" dirty="0" smtClean="0"/>
-              <a:t>       Exercises</a:t>
-            </a:r>
-          </a:p>
-          <a:p>
-            <a:r>
-              <a:rPr lang="en-US" sz="4000" dirty="0" smtClean="0"/>
-              <a:t>       Submissions</a:t>
-            </a:r>
-          </a:p>
-          <a:p>
-            <a:r>
-              <a:rPr lang="en-US" sz="4000" dirty="0" smtClean="0"/>
-              <a:t>       Users</a:t>
-            </a:r>
-          </a:p>
-          <a:p>
-            <a:r>
-              <a:rPr lang="en-US" sz="4000" dirty="0" smtClean="0"/>
-              <a:t>       Settings</a:t>
-            </a:r>
+              <a:rPr lang="en-US" sz="3200" dirty="0"/>
+              <a:t>❏ Classes</a:t>
+            </a:r>
+            <a:endParaRPr lang="en-US" sz="3200" dirty="0" smtClean="0"/>
+          </a:p>
+          <a:p>
+            <a:r>
+              <a:rPr lang="en-US" sz="3200" dirty="0"/>
+              <a:t>❏ Exercises</a:t>
+            </a:r>
+            <a:endParaRPr lang="en-US" sz="3200" dirty="0" smtClean="0"/>
+          </a:p>
+          <a:p>
+            <a:r>
+              <a:rPr lang="en-US" sz="3200" dirty="0" smtClean="0"/>
+              <a:t>❏ </a:t>
+            </a:r>
+            <a:r>
+              <a:rPr lang="en-US" sz="3200" dirty="0"/>
+              <a:t>Submissions</a:t>
+            </a:r>
+            <a:endParaRPr lang="en-US" sz="3200" dirty="0" smtClean="0"/>
+          </a:p>
+          <a:p>
+            <a:r>
+              <a:rPr lang="en-US" sz="3200" dirty="0"/>
+              <a:t>❏ Users</a:t>
+            </a:r>
+            <a:endParaRPr lang="en-US" sz="3200" dirty="0" smtClean="0"/>
+          </a:p>
+          <a:p>
+            <a:r>
+              <a:rPr lang="en-US" sz="3200" dirty="0"/>
+              <a:t>❏ Settings</a:t>
+            </a:r>
+            <a:endParaRPr lang="en-US" sz="3200" dirty="0" smtClean="0"/>
           </a:p>
         </p:txBody>
       </p:sp>
@@ -5338,7 +5342,7 @@
           <p:nvPr/>
         </p:nvPicPr>
         <p:blipFill>
-          <a:blip r:embed="rId7" cstate="print">
+          <a:blip r:embed="rId6" cstate="print">
             <a:extLst>
               <a:ext uri="{28A0092B-C50C-407E-A947-70E740481C1C}">
                 <a14:useLocalDpi xmlns:a14="http://schemas.microsoft.com/office/drawing/2010/main" val="0"/>
@@ -5352,8 +5356,8 @@
         </p:blipFill>
         <p:spPr bwMode="auto">
           <a:xfrm>
-            <a:off x="11554327" y="13734372"/>
-            <a:ext cx="3170076" cy="2433689"/>
+            <a:off x="11791530" y="13734372"/>
+            <a:ext cx="2931045" cy="2250183"/>
           </a:xfrm>
           <a:prstGeom prst="rect">
             <a:avLst/>
@@ -5372,7 +5376,156 @@
       </p:pic>
       <p:pic>
         <p:nvPicPr>
-          <p:cNvPr id="3" name="Picture 2"/>
+          <p:cNvPr id="11" name="Picture 10"/>
+          <p:cNvPicPr>
+            <a:picLocks noChangeAspect="1"/>
+          </p:cNvPicPr>
+          <p:nvPr/>
+        </p:nvPicPr>
+        <p:blipFill>
+          <a:blip r:embed="rId7"/>
+          <a:stretch>
+            <a:fillRect/>
+          </a:stretch>
+        </p:blipFill>
+        <p:spPr>
+          <a:xfrm>
+            <a:off x="15264194" y="16331435"/>
+            <a:ext cx="7423287" cy="4463024"/>
+          </a:xfrm>
+          <a:prstGeom prst="rect">
+            <a:avLst/>
+          </a:prstGeom>
+        </p:spPr>
+      </p:pic>
+      <p:sp>
+        <p:nvSpPr>
+          <p:cNvPr id="16" name="TextBox 15"/>
+          <p:cNvSpPr txBox="1"/>
+          <p:nvPr/>
+        </p:nvSpPr>
+        <p:spPr>
+          <a:xfrm>
+            <a:off x="12675759" y="13270677"/>
+            <a:ext cx="1543050" cy="1077218"/>
+          </a:xfrm>
+          <a:prstGeom prst="rect">
+            <a:avLst/>
+          </a:prstGeom>
+          <a:noFill/>
+        </p:spPr>
+        <p:txBody>
+          <a:bodyPr wrap="square" rtlCol="0">
+            <a:spAutoFit/>
+          </a:bodyPr>
+          <a:lstStyle/>
+          <a:p>
+            <a:pPr algn="ctr"/>
+            <a:r>
+              <a:rPr lang="en-US" sz="3200" dirty="0" smtClean="0"/>
+              <a:t>Internals</a:t>
+            </a:r>
+            <a:endParaRPr lang="en-US" sz="3200" dirty="0"/>
+          </a:p>
+        </p:txBody>
+      </p:sp>
+      <p:sp>
+        <p:nvSpPr>
+          <p:cNvPr id="54" name="TextBox 53"/>
+          <p:cNvSpPr txBox="1"/>
+          <p:nvPr/>
+        </p:nvSpPr>
+        <p:spPr>
+          <a:xfrm>
+            <a:off x="18295996" y="13270677"/>
+            <a:ext cx="3091359" cy="584775"/>
+          </a:xfrm>
+          <a:prstGeom prst="rect">
+            <a:avLst/>
+          </a:prstGeom>
+          <a:noFill/>
+        </p:spPr>
+        <p:txBody>
+          <a:bodyPr wrap="square" rtlCol="0">
+            <a:spAutoFit/>
+          </a:bodyPr>
+          <a:lstStyle/>
+          <a:p>
+            <a:pPr algn="ctr"/>
+            <a:r>
+              <a:rPr lang="en-US" sz="3200" dirty="0" smtClean="0"/>
+              <a:t>Docker SDK</a:t>
+            </a:r>
+            <a:endParaRPr lang="en-US" sz="3200" dirty="0"/>
+          </a:p>
+        </p:txBody>
+      </p:sp>
+      <p:sp>
+        <p:nvSpPr>
+          <p:cNvPr id="20" name="TextBox 19"/>
+          <p:cNvSpPr txBox="1"/>
+          <p:nvPr/>
+        </p:nvSpPr>
+        <p:spPr>
+          <a:xfrm>
+            <a:off x="630712" y="8396772"/>
+            <a:ext cx="9484895" cy="1569660"/>
+          </a:xfrm>
+          <a:prstGeom prst="rect">
+            <a:avLst/>
+          </a:prstGeom>
+          <a:noFill/>
+        </p:spPr>
+        <p:txBody>
+          <a:bodyPr wrap="square" numCol="2" rtlCol="0">
+            <a:spAutoFit/>
+          </a:bodyPr>
+          <a:lstStyle/>
+          <a:p>
+            <a:r>
+              <a:rPr lang="en-US" sz="2400" dirty="0" smtClean="0"/>
+              <a:t>❏ Launch exercises via GUI</a:t>
+            </a:r>
+          </a:p>
+          <a:p>
+            <a:r>
+              <a:rPr lang="en-US" sz="2400" dirty="0" smtClean="0"/>
+              <a:t>❏ Automatic grading/emailing</a:t>
+            </a:r>
+          </a:p>
+          <a:p>
+            <a:r>
+              <a:rPr lang="en-US" sz="2400" dirty="0" smtClean="0"/>
+              <a:t>❏ Configure all data via GUI</a:t>
+            </a:r>
+          </a:p>
+          <a:p>
+            <a:endParaRPr lang="en-US" sz="2400" dirty="0" smtClean="0"/>
+          </a:p>
+          <a:p>
+            <a:r>
+              <a:rPr lang="en-US" sz="2400" dirty="0" smtClean="0"/>
+              <a:t>❏ Secure web portal</a:t>
+            </a:r>
+          </a:p>
+          <a:p>
+            <a:r>
+              <a:rPr lang="en-US" sz="2400" dirty="0" smtClean="0"/>
+              <a:t>❏ Four full virtual exercises</a:t>
+            </a:r>
+          </a:p>
+          <a:p>
+            <a:r>
+              <a:rPr lang="en-US" sz="2400" dirty="0" smtClean="0"/>
+              <a:t>❏ Scales to performance needs</a:t>
+            </a:r>
+            <a:endParaRPr lang="en-US" sz="2400" dirty="0"/>
+          </a:p>
+        </p:txBody>
+      </p:sp>
+      <p:pic>
+        <p:nvPicPr>
+          <p:cNvPr id="1029" name="Picture 1028"/>
           <p:cNvPicPr>
             <a:picLocks noChangeAspect="1"/>
           </p:cNvPicPr>
@@ -5386,8 +5539,8 @@
         </p:blipFill>
         <p:spPr>
           <a:xfrm>
-            <a:off x="12129237" y="22270533"/>
-            <a:ext cx="8626191" cy="2942803"/>
+            <a:off x="11788334" y="21766081"/>
+            <a:ext cx="11909866" cy="7630326"/>
           </a:xfrm>
           <a:prstGeom prst="rect">
             <a:avLst/>
@@ -5396,7 +5549,7 @@
       </p:pic>
       <p:pic>
         <p:nvPicPr>
-          <p:cNvPr id="5" name="Picture 4"/>
+          <p:cNvPr id="71" name="Picture 70"/>
           <p:cNvPicPr>
             <a:picLocks noChangeAspect="1"/>
           </p:cNvPicPr>
@@ -5410,8 +5563,172 @@
         </p:blipFill>
         <p:spPr>
           <a:xfrm>
-            <a:off x="12129236" y="25696733"/>
-            <a:ext cx="8626191" cy="3078499"/>
+            <a:off x="871677" y="22489528"/>
+            <a:ext cx="4967762" cy="2701221"/>
+          </a:xfrm>
+          <a:prstGeom prst="rect">
+            <a:avLst/>
+          </a:prstGeom>
+        </p:spPr>
+      </p:pic>
+      <p:sp>
+        <p:nvSpPr>
+          <p:cNvPr id="1030" name="TextBox 1029"/>
+          <p:cNvSpPr txBox="1"/>
+          <p:nvPr/>
+        </p:nvSpPr>
+        <p:spPr>
+          <a:xfrm>
+            <a:off x="12130840" y="9824798"/>
+            <a:ext cx="10556641" cy="523220"/>
+          </a:xfrm>
+          <a:prstGeom prst="rect">
+            <a:avLst/>
+          </a:prstGeom>
+          <a:noFill/>
+        </p:spPr>
+        <p:txBody>
+          <a:bodyPr wrap="square" numCol="3" rtlCol="0">
+            <a:spAutoFit/>
+          </a:bodyPr>
+          <a:lstStyle/>
+          <a:p>
+            <a:r>
+              <a:rPr lang="en-US" sz="2800" b="1" dirty="0" smtClean="0"/>
+              <a:t>Secure</a:t>
+            </a:r>
+          </a:p>
+          <a:p>
+            <a:r>
+              <a:rPr lang="en-US" sz="2800" b="1" dirty="0" smtClean="0"/>
+              <a:t>Efficient</a:t>
+            </a:r>
+          </a:p>
+          <a:p>
+            <a:r>
+              <a:rPr lang="en-US" sz="2800" b="1" dirty="0" smtClean="0"/>
+              <a:t>Functional</a:t>
+            </a:r>
+            <a:endParaRPr lang="en-US" sz="2800" b="1" dirty="0"/>
+          </a:p>
+        </p:txBody>
+      </p:sp>
+      <p:sp>
+        <p:nvSpPr>
+          <p:cNvPr id="1031" name="TextBox 1030"/>
+          <p:cNvSpPr txBox="1"/>
+          <p:nvPr/>
+        </p:nvSpPr>
+        <p:spPr>
+          <a:xfrm>
+            <a:off x="11768890" y="10233132"/>
+            <a:ext cx="2732095" cy="923330"/>
+          </a:xfrm>
+          <a:prstGeom prst="rect">
+            <a:avLst/>
+          </a:prstGeom>
+          <a:noFill/>
+        </p:spPr>
+        <p:txBody>
+          <a:bodyPr wrap="square" rtlCol="0">
+            <a:spAutoFit/>
+          </a:bodyPr>
+          <a:lstStyle/>
+          <a:p>
+            <a:r>
+              <a:rPr lang="en-US" sz="1800" dirty="0" smtClean="0"/>
+              <a:t>There are zero vulnerabilities in Anchore, </a:t>
+            </a:r>
+            <a:r>
+              <a:rPr lang="en-US" sz="1800" dirty="0"/>
+              <a:t>S</a:t>
+            </a:r>
+            <a:r>
+              <a:rPr lang="en-US" sz="1800" dirty="0" smtClean="0"/>
+              <a:t>onarqube, and ZAP</a:t>
+            </a:r>
+            <a:endParaRPr lang="en-US" sz="1800" dirty="0"/>
+          </a:p>
+        </p:txBody>
+      </p:sp>
+      <p:sp>
+        <p:nvSpPr>
+          <p:cNvPr id="74" name="TextBox 73"/>
+          <p:cNvSpPr txBox="1"/>
+          <p:nvPr/>
+        </p:nvSpPr>
+        <p:spPr>
+          <a:xfrm>
+            <a:off x="14558135" y="10213094"/>
+            <a:ext cx="4168015" cy="923330"/>
+          </a:xfrm>
+          <a:prstGeom prst="rect">
+            <a:avLst/>
+          </a:prstGeom>
+          <a:noFill/>
+        </p:spPr>
+        <p:txBody>
+          <a:bodyPr wrap="square" rtlCol="0">
+            <a:spAutoFit/>
+          </a:bodyPr>
+          <a:lstStyle/>
+          <a:p>
+            <a:r>
+              <a:rPr lang="en-US" sz="1800" dirty="0" smtClean="0"/>
+              <a:t>The Docker Software Development Kit allows virtual machines to be built, started, and stopped in under 20seconds</a:t>
+            </a:r>
+            <a:endParaRPr lang="en-US" sz="1800" dirty="0"/>
+          </a:p>
+        </p:txBody>
+      </p:sp>
+      <p:sp>
+        <p:nvSpPr>
+          <p:cNvPr id="75" name="TextBox 74"/>
+          <p:cNvSpPr txBox="1"/>
+          <p:nvPr/>
+        </p:nvSpPr>
+        <p:spPr>
+          <a:xfrm>
+            <a:off x="18665065" y="10233731"/>
+            <a:ext cx="2732095" cy="923330"/>
+          </a:xfrm>
+          <a:prstGeom prst="rect">
+            <a:avLst/>
+          </a:prstGeom>
+          <a:noFill/>
+        </p:spPr>
+        <p:txBody>
+          <a:bodyPr wrap="square" rtlCol="0">
+            <a:spAutoFit/>
+          </a:bodyPr>
+          <a:lstStyle/>
+          <a:p>
+            <a:r>
+              <a:rPr lang="en-US" sz="1800" dirty="0" smtClean="0"/>
+              <a:t>Student and instructor tasks can be easily done in seconds through the GUI</a:t>
+            </a:r>
+            <a:endParaRPr lang="en-US" sz="1800" dirty="0"/>
+          </a:p>
+        </p:txBody>
+      </p:sp>
+      <p:pic>
+        <p:nvPicPr>
+          <p:cNvPr id="1032" name="Picture 1031"/>
+          <p:cNvPicPr>
+            <a:picLocks noChangeAspect="1"/>
+          </p:cNvPicPr>
+          <p:nvPr/>
+        </p:nvPicPr>
+        <p:blipFill>
+          <a:blip r:embed="rId10"/>
+          <a:stretch>
+            <a:fillRect/>
+          </a:stretch>
+        </p:blipFill>
+        <p:spPr>
+          <a:xfrm>
+            <a:off x="11566370" y="28613697"/>
+            <a:ext cx="4862073" cy="2653763"/>
           </a:xfrm>
           <a:prstGeom prst="rect">
             <a:avLst/>
@@ -5420,14 +5737,14 @@
       </p:pic>
       <p:pic>
         <p:nvPicPr>
-          <p:cNvPr id="1026" name="Picture 2" descr="https://github.com/so87/Security-Lab-Manager/raw/dev/documentation/dev-deploy-process.PNG"/>
+          <p:cNvPr id="1034" name="Picture 4" descr="Official Django logo. Trademark Django Software Foundation."/>
           <p:cNvPicPr>
             <a:picLocks noChangeAspect="1" noChangeArrowheads="1"/>
           </p:cNvPicPr>
           <p:nvPr/>
         </p:nvPicPr>
         <p:blipFill>
-          <a:blip r:embed="rId10">
+          <a:blip r:embed="rId11" cstate="print">
             <a:extLst>
               <a:ext uri="{28A0092B-C50C-407E-A947-70E740481C1C}">
                 <a14:useLocalDpi xmlns:a14="http://schemas.microsoft.com/office/drawing/2010/main" val="0"/>
@@ -5441,8 +5758,8 @@
         </p:blipFill>
         <p:spPr bwMode="auto">
           <a:xfrm>
-            <a:off x="18152156" y="13734722"/>
-            <a:ext cx="3340254" cy="1804019"/>
+            <a:off x="5153639" y="30929306"/>
+            <a:ext cx="2232861" cy="777780"/>
           </a:xfrm>
           <a:prstGeom prst="rect">
             <a:avLst/>
@@ -5461,31 +5778,7 @@
       </p:pic>
       <p:pic>
         <p:nvPicPr>
-          <p:cNvPr id="6" name="Picture 5"/>
-          <p:cNvPicPr>
-            <a:picLocks noChangeAspect="1"/>
-          </p:cNvPicPr>
-          <p:nvPr/>
-        </p:nvPicPr>
-        <p:blipFill>
-          <a:blip r:embed="rId11"/>
-          <a:stretch>
-            <a:fillRect/>
-          </a:stretch>
-        </p:blipFill>
-        <p:spPr>
-          <a:xfrm>
-            <a:off x="14693985" y="14043928"/>
-            <a:ext cx="3413445" cy="1087542"/>
-          </a:xfrm>
-          <a:prstGeom prst="rect">
-            <a:avLst/>
-          </a:prstGeom>
-        </p:spPr>
-      </p:pic>
-      <p:pic>
-        <p:nvPicPr>
-          <p:cNvPr id="11" name="Picture 10"/>
+          <p:cNvPr id="49" name="Picture 48"/>
           <p:cNvPicPr>
             <a:picLocks noChangeAspect="1"/>
           </p:cNvPicPr>
@@ -5499,8 +5792,8 @@
         </p:blipFill>
         <p:spPr>
           <a:xfrm>
-            <a:off x="16253927" y="17036594"/>
-            <a:ext cx="4902001" cy="3145900"/>
+            <a:off x="7995142" y="31573873"/>
+            <a:ext cx="2311329" cy="802364"/>
           </a:xfrm>
           <a:prstGeom prst="rect">
             <a:avLst/>
@@ -5509,14 +5802,74 @@
       </p:pic>
       <p:sp>
         <p:nvSpPr>
-          <p:cNvPr id="16" name="TextBox 15"/>
+          <p:cNvPr id="1035" name="Rectangle 1034"/>
+          <p:cNvSpPr/>
+          <p:nvPr/>
+        </p:nvSpPr>
+        <p:spPr>
+          <a:xfrm>
+            <a:off x="11849924" y="28194000"/>
+            <a:ext cx="4494976" cy="523220"/>
+          </a:xfrm>
+          <a:prstGeom prst="rect">
+            <a:avLst/>
+          </a:prstGeom>
+        </p:spPr>
+        <p:txBody>
+          <a:bodyPr wrap="square">
+            <a:spAutoFit/>
+          </a:bodyPr>
+          <a:lstStyle/>
+          <a:p>
+            <a:pPr algn="ctr"/>
+            <a:r>
+              <a:rPr lang="en-US" sz="2800" b="1" dirty="0" smtClean="0"/>
+              <a:t>Findings over Development</a:t>
+            </a:r>
+            <a:endParaRPr lang="en-US" sz="2800" b="1" dirty="0"/>
+          </a:p>
+        </p:txBody>
+      </p:sp>
+      <p:sp>
+        <p:nvSpPr>
+          <p:cNvPr id="80" name="Rectangle 79"/>
+          <p:cNvSpPr/>
+          <p:nvPr/>
+        </p:nvSpPr>
+        <p:spPr>
+          <a:xfrm>
+            <a:off x="14224138" y="31151612"/>
+            <a:ext cx="4494976" cy="523220"/>
+          </a:xfrm>
+          <a:prstGeom prst="rect">
+            <a:avLst/>
+          </a:prstGeom>
+        </p:spPr>
+        <p:txBody>
+          <a:bodyPr wrap="square">
+            <a:spAutoFit/>
+          </a:bodyPr>
+          <a:lstStyle/>
+          <a:p>
+            <a:pPr algn="ctr"/>
+            <a:r>
+              <a:rPr lang="en-US" sz="2800" b="1" dirty="0" smtClean="0"/>
+              <a:t>Summary</a:t>
+            </a:r>
+            <a:endParaRPr lang="en-US" sz="2800" b="1" dirty="0"/>
+          </a:p>
+        </p:txBody>
+      </p:sp>
+      <p:sp>
+        <p:nvSpPr>
+          <p:cNvPr id="82" name="TextBox 81"/>
           <p:cNvSpPr txBox="1"/>
           <p:nvPr/>
         </p:nvSpPr>
         <p:spPr>
           <a:xfrm>
-            <a:off x="12438556" y="13270677"/>
-            <a:ext cx="1543050" cy="523220"/>
+            <a:off x="11720517" y="31545240"/>
+            <a:ext cx="9479280" cy="830997"/>
           </a:xfrm>
           <a:prstGeom prst="rect">
             <a:avLst/>
@@ -5529,25 +5882,184 @@
           </a:bodyPr>
           <a:lstStyle/>
           <a:p>
+            <a:r>
+              <a:rPr lang="en-US" sz="2400" dirty="0" smtClean="0"/>
+              <a:t>The application met all requirements, is much more efficient than using virtual machines, and helps students learn security in a hands on way.</a:t>
+            </a:r>
+            <a:endParaRPr lang="en-US" sz="2400" dirty="0"/>
+          </a:p>
+        </p:txBody>
+      </p:sp>
+      <p:sp>
+        <p:nvSpPr>
+          <p:cNvPr id="83" name="Rectangle 82"/>
+          <p:cNvSpPr/>
+          <p:nvPr/>
+        </p:nvSpPr>
+        <p:spPr>
+          <a:xfrm>
+            <a:off x="16616435" y="28194000"/>
+            <a:ext cx="4494976" cy="523220"/>
+          </a:xfrm>
+          <a:prstGeom prst="rect">
+            <a:avLst/>
+          </a:prstGeom>
+        </p:spPr>
+        <p:txBody>
+          <a:bodyPr wrap="square">
+            <a:spAutoFit/>
+          </a:bodyPr>
+          <a:lstStyle/>
+          <a:p>
             <a:pPr algn="ctr"/>
             <a:r>
-              <a:rPr lang="en-US" sz="2800" dirty="0" smtClean="0"/>
-              <a:t>Internals</a:t>
-            </a:r>
-            <a:endParaRPr lang="en-US" sz="2800" dirty="0"/>
-          </a:p>
-        </p:txBody>
-      </p:sp>
-      <p:sp>
-        <p:nvSpPr>
-          <p:cNvPr id="53" name="TextBox 52"/>
+              <a:rPr lang="en-US" sz="2800" b="1" dirty="0" smtClean="0"/>
+              <a:t>Codebase Size</a:t>
+            </a:r>
+            <a:endParaRPr lang="en-US" sz="2800" b="1" dirty="0"/>
+          </a:p>
+        </p:txBody>
+      </p:sp>
+      <p:pic>
+        <p:nvPicPr>
+          <p:cNvPr id="1037" name="Picture 1036"/>
+          <p:cNvPicPr>
+            <a:picLocks noChangeAspect="1"/>
+          </p:cNvPicPr>
+          <p:nvPr/>
+        </p:nvPicPr>
+        <p:blipFill>
+          <a:blip r:embed="rId13"/>
+          <a:stretch>
+            <a:fillRect/>
+          </a:stretch>
+        </p:blipFill>
+        <p:spPr>
+          <a:xfrm>
+            <a:off x="17580610" y="28767913"/>
+            <a:ext cx="2575386" cy="2325895"/>
+          </a:xfrm>
+          <a:prstGeom prst="rect">
+            <a:avLst/>
+          </a:prstGeom>
+        </p:spPr>
+      </p:pic>
+      <p:pic>
+        <p:nvPicPr>
+          <p:cNvPr id="1040" name="Picture 1039"/>
+          <p:cNvPicPr>
+            <a:picLocks noChangeAspect="1"/>
+          </p:cNvPicPr>
+          <p:nvPr/>
+        </p:nvPicPr>
+        <p:blipFill>
+          <a:blip r:embed="rId14"/>
+          <a:stretch>
+            <a:fillRect/>
+          </a:stretch>
+        </p:blipFill>
+        <p:spPr>
+          <a:xfrm>
+            <a:off x="917719" y="25914628"/>
+            <a:ext cx="8858250" cy="2028825"/>
+          </a:xfrm>
+          <a:prstGeom prst="rect">
+            <a:avLst/>
+          </a:prstGeom>
+        </p:spPr>
+      </p:pic>
+      <p:pic>
+        <p:nvPicPr>
+          <p:cNvPr id="1041" name="Picture 8" descr="Image result for docker engine"/>
+          <p:cNvPicPr>
+            <a:picLocks noChangeAspect="1" noChangeArrowheads="1"/>
+          </p:cNvPicPr>
+          <p:nvPr/>
+        </p:nvPicPr>
+        <p:blipFill>
+          <a:blip r:embed="rId15">
+            <a:extLst>
+              <a:ext uri="{28A0092B-C50C-407E-A947-70E740481C1C}">
+                <a14:useLocalDpi xmlns:a14="http://schemas.microsoft.com/office/drawing/2010/main" val="0"/>
+              </a:ext>
+            </a:extLst>
+          </a:blip>
+          <a:srcRect/>
+          <a:stretch>
+            <a:fillRect/>
+          </a:stretch>
+        </p:blipFill>
+        <p:spPr bwMode="auto">
+          <a:xfrm>
+            <a:off x="18563303" y="13816566"/>
+            <a:ext cx="2468997" cy="2419618"/>
+          </a:xfrm>
+          <a:prstGeom prst="rect">
+            <a:avLst/>
+          </a:prstGeom>
+          <a:noFill/>
+          <a:extLst>
+            <a:ext uri="{909E8E84-426E-40DD-AFC4-6F175D3DCCD1}">
+              <a14:hiddenFill xmlns:a14="http://schemas.microsoft.com/office/drawing/2010/main">
+                <a:solidFill>
+                  <a:srgbClr val="FFFFFF"/>
+                </a:solidFill>
+              </a14:hiddenFill>
+            </a:ext>
+          </a:extLst>
+        </p:spPr>
+      </p:pic>
+      <p:pic>
+        <p:nvPicPr>
+          <p:cNvPr id="1043" name="Picture 12" descr="Image result for django rest framework"/>
+          <p:cNvPicPr>
+            <a:picLocks noChangeAspect="1" noChangeArrowheads="1"/>
+          </p:cNvPicPr>
+          <p:nvPr/>
+        </p:nvPicPr>
+        <p:blipFill>
+          <a:blip r:embed="rId16" cstate="print">
+            <a:extLst>
+              <a:ext uri="{28A0092B-C50C-407E-A947-70E740481C1C}">
+                <a14:useLocalDpi xmlns:a14="http://schemas.microsoft.com/office/drawing/2010/main" val="0"/>
+              </a:ext>
+            </a:extLst>
+          </a:blip>
+          <a:srcRect/>
+          <a:stretch>
+            <a:fillRect/>
+          </a:stretch>
+        </p:blipFill>
+        <p:spPr bwMode="auto">
+          <a:xfrm>
+            <a:off x="14870962" y="13759135"/>
+            <a:ext cx="3384049" cy="2214720"/>
+          </a:xfrm>
+          <a:prstGeom prst="rect">
+            <a:avLst/>
+          </a:prstGeom>
+          <a:noFill/>
+          <a:extLst>
+            <a:ext uri="{909E8E84-426E-40DD-AFC4-6F175D3DCCD1}">
+              <a14:hiddenFill xmlns:a14="http://schemas.microsoft.com/office/drawing/2010/main">
+                <a:solidFill>
+                  <a:srgbClr val="FFFFFF"/>
+                </a:solidFill>
+              </a14:hiddenFill>
+            </a:ext>
+          </a:extLst>
+        </p:spPr>
+      </p:pic>
+      <p:sp>
+        <p:nvSpPr>
+          <p:cNvPr id="91" name="TextBox 90"/>
           <p:cNvSpPr txBox="1"/>
           <p:nvPr/>
         </p:nvSpPr>
         <p:spPr>
           <a:xfrm>
-            <a:off x="15038434" y="13271616"/>
-            <a:ext cx="3091359" cy="523220"/>
+            <a:off x="14826237" y="13235667"/>
+            <a:ext cx="3310712" cy="584775"/>
           </a:xfrm>
           <a:prstGeom prst="rect">
             <a:avLst/>
@@ -5562,52 +6074,289 @@
           <a:p>
             <a:pPr algn="ctr"/>
             <a:r>
-              <a:rPr lang="en-US" sz="2800" dirty="0" err="1" smtClean="0"/>
-              <a:t>Gunicorn</a:t>
-            </a:r>
-            <a:r>
-              <a:rPr lang="en-US" sz="2800" dirty="0"/>
-              <a:t> </a:t>
-            </a:r>
-            <a:r>
-              <a:rPr lang="en-US" sz="2800" dirty="0" smtClean="0"/>
-              <a:t>- Browser</a:t>
-            </a:r>
-            <a:endParaRPr lang="en-US" sz="2800" dirty="0"/>
-          </a:p>
-        </p:txBody>
-      </p:sp>
-      <p:sp>
-        <p:nvSpPr>
-          <p:cNvPr id="54" name="TextBox 53"/>
-          <p:cNvSpPr txBox="1"/>
+              <a:rPr lang="en-US" sz="3200" dirty="0" smtClean="0"/>
+              <a:t>REST Framework</a:t>
+            </a:r>
+            <a:endParaRPr lang="en-US" sz="3200" dirty="0"/>
+          </a:p>
+        </p:txBody>
+      </p:sp>
+      <p:sp>
+        <p:nvSpPr>
+          <p:cNvPr id="92" name="Rectangle 91"/>
+          <p:cNvSpPr/>
           <p:nvPr/>
         </p:nvSpPr>
         <p:spPr>
           <a:xfrm>
-            <a:off x="18368359" y="13271462"/>
-            <a:ext cx="3091359" cy="523220"/>
-          </a:xfrm>
-          <a:prstGeom prst="rect">
-            <a:avLst/>
-          </a:prstGeom>
-          <a:noFill/>
-        </p:spPr>
-        <p:txBody>
-          <a:bodyPr wrap="square" rtlCol="0">
+            <a:off x="917719" y="25448186"/>
+            <a:ext cx="8858250" cy="523220"/>
+          </a:xfrm>
+          <a:prstGeom prst="rect">
+            <a:avLst/>
+          </a:prstGeom>
+        </p:spPr>
+        <p:txBody>
+          <a:bodyPr wrap="square">
             <a:spAutoFit/>
           </a:bodyPr>
           <a:lstStyle/>
           <a:p>
             <a:pPr algn="ctr"/>
             <a:r>
-              <a:rPr lang="en-US" sz="2800" dirty="0" smtClean="0"/>
-              <a:t>Network Setup</a:t>
-            </a:r>
-            <a:endParaRPr lang="en-US" sz="2800" dirty="0"/>
-          </a:p>
-        </p:txBody>
-      </p:sp>
+              <a:rPr lang="en-US" sz="2800" b="1" dirty="0" smtClean="0"/>
+              <a:t>Jenkins runs Anchore, Sonarqube, and ZAP scans</a:t>
+            </a:r>
+            <a:endParaRPr lang="en-US" sz="2800" b="1" dirty="0"/>
+          </a:p>
+        </p:txBody>
+      </p:sp>
+      <p:sp>
+        <p:nvSpPr>
+          <p:cNvPr id="93" name="Rectangle 92"/>
+          <p:cNvSpPr/>
+          <p:nvPr/>
+        </p:nvSpPr>
+        <p:spPr>
+          <a:xfrm>
+            <a:off x="814112" y="20035071"/>
+            <a:ext cx="8858250" cy="523220"/>
+          </a:xfrm>
+          <a:prstGeom prst="rect">
+            <a:avLst/>
+          </a:prstGeom>
+        </p:spPr>
+        <p:txBody>
+          <a:bodyPr wrap="square">
+            <a:spAutoFit/>
+          </a:bodyPr>
+          <a:lstStyle/>
+          <a:p>
+            <a:pPr algn="ctr"/>
+            <a:r>
+              <a:rPr lang="en-US" sz="2800" b="1" dirty="0" smtClean="0"/>
+              <a:t>Kanban boards </a:t>
+            </a:r>
+            <a:r>
+              <a:rPr lang="en-US" sz="2800" b="1" dirty="0" smtClean="0"/>
+              <a:t>for project Management</a:t>
+            </a:r>
+            <a:endParaRPr lang="en-US" sz="2800" b="1" dirty="0"/>
+          </a:p>
+        </p:txBody>
+      </p:sp>
+      <p:sp>
+        <p:nvSpPr>
+          <p:cNvPr id="94" name="Rectangle 93"/>
+          <p:cNvSpPr/>
+          <p:nvPr/>
+        </p:nvSpPr>
+        <p:spPr>
+          <a:xfrm>
+            <a:off x="917719" y="21979978"/>
+            <a:ext cx="8858250" cy="523220"/>
+          </a:xfrm>
+          <a:prstGeom prst="rect">
+            <a:avLst/>
+          </a:prstGeom>
+        </p:spPr>
+        <p:txBody>
+          <a:bodyPr wrap="square">
+            <a:spAutoFit/>
+          </a:bodyPr>
+          <a:lstStyle/>
+          <a:p>
+            <a:pPr algn="ctr"/>
+            <a:r>
+              <a:rPr lang="en-US" sz="2800" b="1" dirty="0" smtClean="0"/>
+              <a:t>VSCODE, Docker, and Chrome for development </a:t>
+            </a:r>
+            <a:endParaRPr lang="en-US" sz="2800" b="1" dirty="0"/>
+          </a:p>
+        </p:txBody>
+      </p:sp>
+      <p:sp>
+        <p:nvSpPr>
+          <p:cNvPr id="95" name="Rectangle 94"/>
+          <p:cNvSpPr/>
+          <p:nvPr/>
+        </p:nvSpPr>
+        <p:spPr>
+          <a:xfrm>
+            <a:off x="917719" y="27769293"/>
+            <a:ext cx="8858250" cy="954107"/>
+          </a:xfrm>
+          <a:prstGeom prst="rect">
+            <a:avLst/>
+          </a:prstGeom>
+        </p:spPr>
+        <p:txBody>
+          <a:bodyPr wrap="square">
+            <a:spAutoFit/>
+          </a:bodyPr>
+          <a:lstStyle/>
+          <a:p>
+            <a:pPr algn="ctr"/>
+            <a:r>
+              <a:rPr lang="en-US" sz="2800" b="1" dirty="0" smtClean="0"/>
+              <a:t>Store Security reports, push code and </a:t>
+            </a:r>
+            <a:r>
+              <a:rPr lang="en-US" sz="2800" b="1" dirty="0"/>
+              <a:t>D</a:t>
+            </a:r>
+            <a:r>
+              <a:rPr lang="en-US" sz="2800" b="1" dirty="0" smtClean="0"/>
+              <a:t>ocker images to source control, deploy to production</a:t>
+            </a:r>
+            <a:endParaRPr lang="en-US" sz="2800" b="1" dirty="0"/>
+          </a:p>
+        </p:txBody>
+      </p:sp>
+      <p:pic>
+        <p:nvPicPr>
+          <p:cNvPr id="1044" name="Picture 1043"/>
+          <p:cNvPicPr>
+            <a:picLocks noChangeAspect="1"/>
+          </p:cNvPicPr>
+          <p:nvPr/>
+        </p:nvPicPr>
+        <p:blipFill>
+          <a:blip r:embed="rId17"/>
+          <a:stretch>
+            <a:fillRect/>
+          </a:stretch>
+        </p:blipFill>
+        <p:spPr>
+          <a:xfrm>
+            <a:off x="1214420" y="28718503"/>
+            <a:ext cx="3967044" cy="2132477"/>
+          </a:xfrm>
+          <a:prstGeom prst="rect">
+            <a:avLst/>
+          </a:prstGeom>
+        </p:spPr>
+      </p:pic>
+      <p:pic>
+        <p:nvPicPr>
+          <p:cNvPr id="1045" name="Picture 1044"/>
+          <p:cNvPicPr>
+            <a:picLocks noChangeAspect="1"/>
+          </p:cNvPicPr>
+          <p:nvPr/>
+        </p:nvPicPr>
+        <p:blipFill>
+          <a:blip r:embed="rId18"/>
+          <a:stretch>
+            <a:fillRect/>
+          </a:stretch>
+        </p:blipFill>
+        <p:spPr>
+          <a:xfrm>
+            <a:off x="6176831" y="22499083"/>
+            <a:ext cx="3729169" cy="852573"/>
+          </a:xfrm>
+          <a:prstGeom prst="rect">
+            <a:avLst/>
+          </a:prstGeom>
+        </p:spPr>
+      </p:pic>
+      <p:pic>
+        <p:nvPicPr>
+          <p:cNvPr id="1046" name="Picture 1045"/>
+          <p:cNvPicPr>
+            <a:picLocks noChangeAspect="1"/>
+          </p:cNvPicPr>
+          <p:nvPr/>
+        </p:nvPicPr>
+        <p:blipFill>
+          <a:blip r:embed="rId19"/>
+          <a:stretch>
+            <a:fillRect/>
+          </a:stretch>
+        </p:blipFill>
+        <p:spPr>
+          <a:xfrm>
+            <a:off x="6252913" y="23525132"/>
+            <a:ext cx="3933799" cy="1780674"/>
+          </a:xfrm>
+          <a:prstGeom prst="rect">
+            <a:avLst/>
+          </a:prstGeom>
+        </p:spPr>
+      </p:pic>
+      <p:pic>
+        <p:nvPicPr>
+          <p:cNvPr id="1047" name="Picture 1046"/>
+          <p:cNvPicPr>
+            <a:picLocks noChangeAspect="1"/>
+          </p:cNvPicPr>
+          <p:nvPr/>
+        </p:nvPicPr>
+        <p:blipFill>
+          <a:blip r:embed="rId20"/>
+          <a:stretch>
+            <a:fillRect/>
+          </a:stretch>
+        </p:blipFill>
+        <p:spPr>
+          <a:xfrm>
+            <a:off x="5598159" y="28718503"/>
+            <a:ext cx="3884602" cy="1586434"/>
+          </a:xfrm>
+          <a:prstGeom prst="rect">
+            <a:avLst/>
+          </a:prstGeom>
+        </p:spPr>
+      </p:pic>
+      <p:pic>
+        <p:nvPicPr>
+          <p:cNvPr id="17" name="Picture 16"/>
+          <p:cNvPicPr>
+            <a:picLocks noChangeAspect="1"/>
+          </p:cNvPicPr>
+          <p:nvPr/>
+        </p:nvPicPr>
+        <p:blipFill>
+          <a:blip r:embed="rId21"/>
+          <a:stretch>
+            <a:fillRect/>
+          </a:stretch>
+        </p:blipFill>
+        <p:spPr>
+          <a:xfrm>
+            <a:off x="711107" y="15580233"/>
+            <a:ext cx="9443743" cy="2625439"/>
+          </a:xfrm>
+          <a:prstGeom prst="rect">
+            <a:avLst/>
+          </a:prstGeom>
+        </p:spPr>
+      </p:pic>
+      <p:pic>
+        <p:nvPicPr>
+          <p:cNvPr id="19" name="Picture 18"/>
+          <p:cNvPicPr>
+            <a:picLocks noChangeAspect="1"/>
+          </p:cNvPicPr>
+          <p:nvPr/>
+        </p:nvPicPr>
+        <p:blipFill>
+          <a:blip r:embed="rId22"/>
+          <a:stretch>
+            <a:fillRect/>
+          </a:stretch>
+        </p:blipFill>
+        <p:spPr>
+          <a:xfrm>
+            <a:off x="2056650" y="20518854"/>
+            <a:ext cx="6373174" cy="1242958"/>
+          </a:xfrm>
+          <a:prstGeom prst="rect">
+            <a:avLst/>
+          </a:prstGeom>
+        </p:spPr>
+      </p:pic>
     </p:spTree>
     <p:extLst>
       <p:ext uri="{BB962C8B-B14F-4D97-AF65-F5344CB8AC3E}">
@@ -6431,7 +7180,7 @@
 </file>
 
 <file path=customXml/itemProps2.xml><?xml version="1.0" encoding="utf-8"?>
-<ds:datastoreItem xmlns:ds="http://schemas.openxmlformats.org/officeDocument/2006/customXml" ds:itemID="{2EF28B04-7BD9-4708-B545-D41AE94ED983}">
+<ds:datastoreItem xmlns:ds="http://schemas.openxmlformats.org/officeDocument/2006/customXml" ds:itemID="{E88F0995-72E3-441E-A368-0BAFED719E82}">
   <ds:schemaRefs>
     <ds:schemaRef ds:uri="http://www.w3.org/2001/XMLSchema"/>
     <ds:schemaRef ds:uri="http://www.boldonjames.com/2008/01/sie/internal/label"/>

</xml_diff>